<commit_message>
slide updates; scala foldr param ordering
</commit_message>
<xml_diff>
--- a/JaxFunc.pptx
+++ b/JaxFunc.pptx
@@ -17,13 +17,22 @@
     <p:sldId id="266" r:id="rId11"/>
     <p:sldId id="260" r:id="rId12"/>
     <p:sldId id="281" r:id="rId13"/>
-    <p:sldId id="257" r:id="rId14"/>
-    <p:sldId id="258" r:id="rId15"/>
-    <p:sldId id="259" r:id="rId16"/>
-    <p:sldId id="268" r:id="rId17"/>
-    <p:sldId id="276" r:id="rId18"/>
-    <p:sldId id="271" r:id="rId19"/>
-    <p:sldId id="275" r:id="rId20"/>
+    <p:sldId id="288" r:id="rId14"/>
+    <p:sldId id="257" r:id="rId15"/>
+    <p:sldId id="286" r:id="rId16"/>
+    <p:sldId id="285" r:id="rId17"/>
+    <p:sldId id="258" r:id="rId18"/>
+    <p:sldId id="259" r:id="rId19"/>
+    <p:sldId id="268" r:id="rId20"/>
+    <p:sldId id="295" r:id="rId21"/>
+    <p:sldId id="296" r:id="rId22"/>
+    <p:sldId id="282" r:id="rId23"/>
+    <p:sldId id="275" r:id="rId24"/>
+    <p:sldId id="283" r:id="rId25"/>
+    <p:sldId id="289" r:id="rId26"/>
+    <p:sldId id="290" r:id="rId27"/>
+    <p:sldId id="294" r:id="rId28"/>
+    <p:sldId id="293" r:id="rId29"/>
   </p:sldIdLst>
   <p:sldSz cx="9144000" cy="6858000" type="screen4x3"/>
   <p:notesSz cx="6858000" cy="9144000"/>
@@ -504,6 +513,7 @@
           <a:p>
             <a:fld id="{B5FBB243-1215-0146-8C14-45727866649E}" type="datetimeFigureOut">
               <a:rPr lang="en-US" smtClean="0"/>
+              <a:pPr/>
               <a:t>6/13/10</a:t>
             </a:fld>
             <a:endParaRPr lang="en-US"/>
@@ -670,6 +680,7 @@
           <a:p>
             <a:fld id="{B5FBB243-1215-0146-8C14-45727866649E}" type="datetimeFigureOut">
               <a:rPr lang="en-US" smtClean="0"/>
+              <a:pPr/>
               <a:t>6/13/10</a:t>
             </a:fld>
             <a:endParaRPr lang="en-US"/>
@@ -712,6 +723,7 @@
           <a:p>
             <a:fld id="{AFF90F2D-082B-2947-A28A-E335CE8F5CDD}" type="slidenum">
               <a:rPr lang="en-US" smtClean="0"/>
+              <a:pPr/>
               <a:t>‹#›</a:t>
             </a:fld>
             <a:endParaRPr lang="en-US"/>
@@ -845,6 +857,7 @@
           <a:p>
             <a:fld id="{B5FBB243-1215-0146-8C14-45727866649E}" type="datetimeFigureOut">
               <a:rPr lang="en-US" smtClean="0"/>
+              <a:pPr/>
               <a:t>6/13/10</a:t>
             </a:fld>
             <a:endParaRPr lang="en-US"/>
@@ -887,6 +900,7 @@
           <a:p>
             <a:fld id="{AFF90F2D-082B-2947-A28A-E335CE8F5CDD}" type="slidenum">
               <a:rPr lang="en-US" smtClean="0"/>
+              <a:pPr/>
               <a:t>‹#›</a:t>
             </a:fld>
             <a:endParaRPr lang="en-US"/>
@@ -1014,6 +1028,7 @@
           <a:p>
             <a:fld id="{B5FBB243-1215-0146-8C14-45727866649E}" type="datetimeFigureOut">
               <a:rPr lang="en-US" smtClean="0"/>
+              <a:pPr/>
               <a:t>6/13/10</a:t>
             </a:fld>
             <a:endParaRPr lang="en-US"/>
@@ -1056,6 +1071,7 @@
           <a:p>
             <a:fld id="{AFF90F2D-082B-2947-A28A-E335CE8F5CDD}" type="slidenum">
               <a:rPr lang="en-US" smtClean="0"/>
+              <a:pPr/>
               <a:t>‹#›</a:t>
             </a:fld>
             <a:endParaRPr lang="en-US"/>
@@ -1464,6 +1480,7 @@
           <a:p>
             <a:fld id="{B5FBB243-1215-0146-8C14-45727866649E}" type="datetimeFigureOut">
               <a:rPr lang="en-US" smtClean="0"/>
+              <a:pPr/>
               <a:t>6/13/10</a:t>
             </a:fld>
             <a:endParaRPr lang="en-US"/>
@@ -1506,6 +1523,7 @@
           <a:p>
             <a:fld id="{AFF90F2D-082B-2947-A28A-E335CE8F5CDD}" type="slidenum">
               <a:rPr lang="en-US" smtClean="0"/>
+              <a:pPr/>
               <a:t>‹#›</a:t>
             </a:fld>
             <a:endParaRPr lang="en-US"/>
@@ -1728,6 +1746,7 @@
           <a:p>
             <a:fld id="{B5FBB243-1215-0146-8C14-45727866649E}" type="datetimeFigureOut">
               <a:rPr lang="en-US" smtClean="0"/>
+              <a:pPr/>
               <a:t>6/13/10</a:t>
             </a:fld>
             <a:endParaRPr lang="en-US"/>
@@ -1770,6 +1789,7 @@
           <a:p>
             <a:fld id="{AFF90F2D-082B-2947-A28A-E335CE8F5CDD}" type="slidenum">
               <a:rPr lang="en-US" smtClean="0"/>
+              <a:pPr/>
               <a:t>‹#›</a:t>
             </a:fld>
             <a:endParaRPr lang="en-US"/>
@@ -2102,6 +2122,7 @@
           <a:p>
             <a:fld id="{B5FBB243-1215-0146-8C14-45727866649E}" type="datetimeFigureOut">
               <a:rPr lang="en-US" smtClean="0"/>
+              <a:pPr/>
               <a:t>6/13/10</a:t>
             </a:fld>
             <a:endParaRPr lang="en-US"/>
@@ -2144,6 +2165,7 @@
           <a:p>
             <a:fld id="{AFF90F2D-082B-2947-A28A-E335CE8F5CDD}" type="slidenum">
               <a:rPr lang="en-US" smtClean="0"/>
+              <a:pPr/>
               <a:t>‹#›</a:t>
             </a:fld>
             <a:endParaRPr lang="en-US"/>
@@ -2224,6 +2246,7 @@
           <a:p>
             <a:fld id="{B5FBB243-1215-0146-8C14-45727866649E}" type="datetimeFigureOut">
               <a:rPr lang="en-US" smtClean="0"/>
+              <a:pPr/>
               <a:t>6/13/10</a:t>
             </a:fld>
             <a:endParaRPr lang="en-US"/>
@@ -2247,6 +2270,7 @@
           <a:p>
             <a:fld id="{AFF90F2D-082B-2947-A28A-E335CE8F5CDD}" type="slidenum">
               <a:rPr lang="en-US" smtClean="0"/>
+              <a:pPr/>
               <a:t>‹#›</a:t>
             </a:fld>
             <a:endParaRPr lang="en-US"/>
@@ -2314,6 +2338,7 @@
           <a:p>
             <a:fld id="{B5FBB243-1215-0146-8C14-45727866649E}" type="datetimeFigureOut">
               <a:rPr lang="en-US" smtClean="0"/>
+              <a:pPr/>
               <a:t>6/13/10</a:t>
             </a:fld>
             <a:endParaRPr lang="en-US"/>
@@ -2356,6 +2381,7 @@
           <a:p>
             <a:fld id="{AFF90F2D-082B-2947-A28A-E335CE8F5CDD}" type="slidenum">
               <a:rPr lang="en-US" smtClean="0"/>
+              <a:pPr/>
               <a:t>‹#›</a:t>
             </a:fld>
             <a:endParaRPr lang="en-US"/>
@@ -2563,6 +2589,7 @@
           <a:p>
             <a:fld id="{B5FBB243-1215-0146-8C14-45727866649E}" type="datetimeFigureOut">
               <a:rPr lang="en-US" smtClean="0"/>
+              <a:pPr/>
               <a:t>6/13/10</a:t>
             </a:fld>
             <a:endParaRPr lang="en-US"/>
@@ -2610,6 +2637,7 @@
           <a:p>
             <a:fld id="{AFF90F2D-082B-2947-A28A-E335CE8F5CDD}" type="slidenum">
               <a:rPr lang="en-US" smtClean="0"/>
+              <a:pPr/>
               <a:t>‹#›</a:t>
             </a:fld>
             <a:endParaRPr lang="en-US"/>
@@ -2822,6 +2850,7 @@
           <a:p>
             <a:fld id="{B5FBB243-1215-0146-8C14-45727866649E}" type="datetimeFigureOut">
               <a:rPr lang="en-US" smtClean="0"/>
+              <a:pPr/>
               <a:t>6/13/10</a:t>
             </a:fld>
             <a:endParaRPr lang="en-US"/>
@@ -2864,6 +2893,7 @@
           <a:p>
             <a:fld id="{AFF90F2D-082B-2947-A28A-E335CE8F5CDD}" type="slidenum">
               <a:rPr lang="en-US" smtClean="0"/>
+              <a:pPr/>
               <a:t>‹#›</a:t>
             </a:fld>
             <a:endParaRPr lang="en-US"/>
@@ -3226,6 +3256,7 @@
           <a:p>
             <a:fld id="{B5FBB243-1215-0146-8C14-45727866649E}" type="datetimeFigureOut">
               <a:rPr lang="en-US" smtClean="0"/>
+              <a:pPr/>
               <a:t>6/13/10</a:t>
             </a:fld>
             <a:endParaRPr lang="en-US"/>
@@ -3304,6 +3335,7 @@
           <a:p>
             <a:fld id="{AFF90F2D-082B-2947-A28A-E335CE8F5CDD}" type="slidenum">
               <a:rPr lang="en-US" smtClean="0"/>
+              <a:pPr/>
               <a:t>‹#›</a:t>
             </a:fld>
             <a:endParaRPr lang="en-US"/>
@@ -3682,11 +3714,7 @@
           <a:p>
             <a:r>
               <a:rPr lang="en-US" dirty="0" smtClean="0"/>
-              <a:t>f</a:t>
-            </a:r>
-            <a:r>
-              <a:rPr lang="en-US" dirty="0" smtClean="0"/>
-              <a:t>or Imperative Programmers</a:t>
+              <a:t>for Imperative Programmers</a:t>
             </a:r>
             <a:endParaRPr lang="en-US" dirty="0"/>
           </a:p>
@@ -3940,7 +3968,7 @@
             <a:r>
               <a:rPr lang="en-US" i="1" dirty="0" smtClean="0">
                 <a:solidFill>
-                  <a:schemeClr val="accent2"/>
+                  <a:srgbClr val="6EA0B0"/>
                 </a:solidFill>
               </a:rPr>
               <a:t>def</a:t>
@@ -3957,13 +3985,8 @@
             </a:pPr>
             <a:r>
               <a:rPr lang="en-US" dirty="0" smtClean="0"/>
-              <a:t>How a programming language refers to such a construct is entirely preferential</a:t>
-            </a:r>
-            <a:r>
-              <a:rPr lang="en-US" dirty="0" smtClean="0"/>
-              <a:t>.</a:t>
-            </a:r>
-            <a:endParaRPr lang="en-US" dirty="0" smtClean="0"/>
+              <a:t>How a programming language refers to such a construct is entirely preferential.</a:t>
+            </a:r>
           </a:p>
         </p:txBody>
       </p:sp>
@@ -4022,7 +4045,11 @@
             <a:pPr algn="ctr"/>
             <a:r>
               <a:rPr lang="en-US" dirty="0" smtClean="0"/>
-              <a:t>Function Composition</a:t>
+              <a:t>Function </a:t>
+            </a:r>
+            <a:r>
+              <a:rPr lang="en-US" dirty="0" smtClean="0"/>
+              <a:t>Composition</a:t>
             </a:r>
             <a:endParaRPr lang="en-US" dirty="0"/>
           </a:p>
@@ -4149,15 +4176,12 @@
             </a:r>
             <a:r>
               <a:rPr lang="en-US" i="1" dirty="0" smtClean="0"/>
-              <a:t>This painting has an orderly	composition.</a:t>
-            </a:r>
-          </a:p>
-          <a:p>
-            <a:pPr>
-              <a:buFont typeface="Wingdings" charset="2"/>
-              <a:buChar char="§"/>
-            </a:pPr>
-            <a:endParaRPr lang="en-US" dirty="0"/>
+              <a:t>This painting has an orderly	</a:t>
+            </a:r>
+            <a:r>
+              <a:rPr lang="en-US" i="1" dirty="0" smtClean="0"/>
+              <a:t>composition.</a:t>
+            </a:r>
           </a:p>
         </p:txBody>
       </p:sp>
@@ -4166,6 +4190,13 @@
   <p:clrMapOvr>
     <a:masterClrMapping/>
   </p:clrMapOvr>
+  <p:timing>
+    <p:tnLst>
+      <p:par>
+        <p:cTn id="1" dur="indefinite" restart="never" nodeType="tmRoot"/>
+      </p:par>
+    </p:tnLst>
+  </p:timing>
 </p:sld>
 </file>
 
@@ -4188,36 +4219,19 @@
       </p:grpSpPr>
       <p:sp>
         <p:nvSpPr>
-          <p:cNvPr id="2" name="Title 1"/>
-          <p:cNvSpPr>
-            <a:spLocks noGrp="1"/>
-          </p:cNvSpPr>
-          <p:nvPr>
-            <p:ph type="title"/>
+          <p:cNvPr id="3" name="Content Placeholder 2"/>
+          <p:cNvSpPr>
+            <a:spLocks noGrp="1"/>
+          </p:cNvSpPr>
+          <p:nvPr>
+            <p:ph idx="1"/>
           </p:nvPr>
         </p:nvSpPr>
         <p:spPr/>
         <p:txBody>
-          <a:bodyPr/>
-          <a:lstStyle/>
-          <a:p>
-            <a:endParaRPr lang="en-US" dirty="0"/>
-          </a:p>
-        </p:txBody>
-      </p:sp>
-      <p:sp>
-        <p:nvSpPr>
-          <p:cNvPr id="3" name="Content Placeholder 2"/>
-          <p:cNvSpPr>
-            <a:spLocks noGrp="1"/>
-          </p:cNvSpPr>
-          <p:nvPr>
-            <p:ph idx="1"/>
-          </p:nvPr>
-        </p:nvSpPr>
-        <p:spPr/>
-        <p:txBody>
-          <a:bodyPr/>
+          <a:bodyPr>
+            <a:normAutofit/>
+          </a:bodyPr>
           <a:lstStyle/>
           <a:p>
             <a:pPr>
@@ -4225,51 +4239,56 @@
               <a:buChar char="§"/>
             </a:pPr>
             <a:r>
-              <a:rPr lang="en-US" i="1" dirty="0" err="1" smtClean="0">
-                <a:solidFill>
-                  <a:srgbClr val="CCAF0A"/>
-                </a:solidFill>
-                <a:latin typeface="+mj-lt"/>
-                <a:cs typeface="Rockwell"/>
-              </a:rPr>
-              <a:t>f</a:t>
-            </a:r>
-            <a:r>
-              <a:rPr lang="en-US" i="1" dirty="0" smtClean="0">
-                <a:solidFill>
-                  <a:srgbClr val="CCAF0A"/>
-                </a:solidFill>
-                <a:latin typeface="+mj-lt"/>
-                <a:cs typeface="Rockwell"/>
-              </a:rPr>
-              <a:t>: X -&gt; Y </a:t>
-            </a:r>
-            <a:r>
-              <a:rPr lang="en-US" dirty="0" smtClean="0">
-                <a:latin typeface="+mj-lt"/>
-                <a:cs typeface="Rockwell"/>
-              </a:rPr>
-              <a:t>and </a:t>
-            </a:r>
-            <a:r>
-              <a:rPr lang="en-US" i="1" dirty="0" err="1" smtClean="0">
-                <a:solidFill>
-                  <a:srgbClr val="CCAF0A"/>
-                </a:solidFill>
-                <a:latin typeface="+mj-lt"/>
-                <a:cs typeface="Rockwell"/>
-              </a:rPr>
-              <a:t>g</a:t>
-            </a:r>
-            <a:r>
-              <a:rPr lang="en-US" i="1" dirty="0" smtClean="0">
-                <a:solidFill>
-                  <a:srgbClr val="CCAF0A"/>
-                </a:solidFill>
-                <a:latin typeface="+mj-lt"/>
-                <a:cs typeface="Rockwell"/>
-              </a:rPr>
-              <a:t>: Y -&gt; Z</a:t>
+              <a:rPr lang="en-US" dirty="0" err="1" smtClean="0"/>
+              <a:t>com·po·si·tion</a:t>
+            </a:r>
+            <a:r>
+              <a:rPr lang="en-US" dirty="0" smtClean="0"/>
+              <a:t> </a:t>
+            </a:r>
+            <a:r>
+              <a:rPr lang="en-US" i="1" dirty="0" smtClean="0"/>
+              <a:t>-noun</a:t>
+            </a:r>
+            <a:r>
+              <a:rPr lang="en-US" dirty="0" smtClean="0"/>
+              <a:t/>
+            </a:r>
+            <a:br>
+              <a:rPr lang="en-US" dirty="0" smtClean="0"/>
+            </a:br>
+            <a:r>
+              <a:rPr lang="en-US" dirty="0" smtClean="0"/>
+              <a:t>1. the act of combining parts or 	elements to form a whole</a:t>
+            </a:r>
+            <a:br>
+              <a:rPr lang="en-US" dirty="0" smtClean="0"/>
+            </a:br>
+            <a:r>
+              <a:rPr lang="en-US" dirty="0" smtClean="0"/>
+              <a:t>2. the resulting state or product</a:t>
+            </a:r>
+            <a:br>
+              <a:rPr lang="en-US" dirty="0" smtClean="0"/>
+            </a:br>
+            <a:r>
+              <a:rPr lang="en-US" dirty="0" smtClean="0"/>
+              <a:t>3. manner of being composed;</a:t>
+            </a:r>
+            <a:br>
+              <a:rPr lang="en-US" dirty="0" smtClean="0"/>
+            </a:br>
+            <a:r>
+              <a:rPr lang="en-US" dirty="0" smtClean="0"/>
+              <a:t>structure: </a:t>
+            </a:r>
+            <a:r>
+              <a:rPr lang="en-US" i="1" dirty="0" smtClean="0"/>
+              <a:t>This painting has an orderly	</a:t>
+            </a:r>
+            <a:r>
+              <a:rPr lang="en-US" i="1" dirty="0" smtClean="0"/>
+              <a:t>composition.</a:t>
             </a:r>
           </a:p>
           <a:p>
@@ -4277,194 +4296,25 @@
               <a:buFont typeface="Wingdings" charset="2"/>
               <a:buChar char="§"/>
             </a:pPr>
-            <a:r>
-              <a:rPr lang="en-US" dirty="0" smtClean="0">
-                <a:latin typeface="+mj-lt"/>
-                <a:cs typeface="Rockwell"/>
-              </a:rPr>
-              <a:t>The domains of these functions are suitable for composition.</a:t>
-            </a:r>
+            <a:endParaRPr lang="en-US" i="1" dirty="0" smtClean="0"/>
           </a:p>
           <a:p>
             <a:pPr>
-              <a:buFont typeface="Wingdings" charset="2"/>
-              <a:buChar char="§"/>
+              <a:buNone/>
             </a:pPr>
             <a:r>
-              <a:rPr lang="en-US" i="1" dirty="0" smtClean="0">
-                <a:solidFill>
-                  <a:srgbClr val="CCAF0A"/>
-                </a:solidFill>
-                <a:latin typeface="+mj-lt"/>
-                <a:cs typeface="Rockwell"/>
-              </a:rPr>
-              <a:t>(</a:t>
-            </a:r>
-            <a:r>
-              <a:rPr lang="en-US" i="1" dirty="0" err="1" smtClean="0">
-                <a:solidFill>
-                  <a:srgbClr val="CCAF0A"/>
-                </a:solidFill>
-                <a:latin typeface="+mj-lt"/>
-                <a:cs typeface="Rockwell"/>
-              </a:rPr>
-              <a:t>g</a:t>
-            </a:r>
-            <a:r>
-              <a:rPr lang="en-US" i="1" dirty="0" smtClean="0">
-                <a:solidFill>
-                  <a:srgbClr val="CCAF0A"/>
-                </a:solidFill>
-                <a:latin typeface="+mj-lt"/>
-                <a:cs typeface="Rockwell"/>
-              </a:rPr>
-              <a:t> </a:t>
-            </a:r>
-            <a:r>
-              <a:rPr lang="en-US" i="1" dirty="0" err="1" smtClean="0">
-                <a:solidFill>
-                  <a:srgbClr val="CCAF0A"/>
-                </a:solidFill>
-                <a:latin typeface="+mj-lt"/>
-                <a:cs typeface="Rockwell"/>
-              </a:rPr>
-              <a:t>o</a:t>
-            </a:r>
-            <a:r>
-              <a:rPr lang="en-US" i="1" dirty="0" smtClean="0">
-                <a:solidFill>
-                  <a:srgbClr val="CCAF0A"/>
-                </a:solidFill>
-                <a:latin typeface="+mj-lt"/>
-                <a:cs typeface="Rockwell"/>
-              </a:rPr>
-              <a:t> </a:t>
-            </a:r>
-            <a:r>
-              <a:rPr lang="en-US" i="1" dirty="0" err="1" smtClean="0">
-                <a:solidFill>
-                  <a:srgbClr val="CCAF0A"/>
-                </a:solidFill>
-                <a:latin typeface="+mj-lt"/>
-                <a:cs typeface="Rockwell"/>
-              </a:rPr>
-              <a:t>f</a:t>
-            </a:r>
-            <a:r>
-              <a:rPr lang="en-US" i="1" dirty="0" smtClean="0">
-                <a:solidFill>
-                  <a:srgbClr val="CCAF0A"/>
-                </a:solidFill>
-                <a:latin typeface="+mj-lt"/>
-                <a:cs typeface="Rockwell"/>
-              </a:rPr>
-              <a:t>) = </a:t>
-            </a:r>
-            <a:r>
-              <a:rPr lang="en-US" i="1" dirty="0" err="1" smtClean="0">
-                <a:solidFill>
-                  <a:srgbClr val="CCAF0A"/>
-                </a:solidFill>
-                <a:latin typeface="+mj-lt"/>
-                <a:cs typeface="Rockwell"/>
-              </a:rPr>
-              <a:t>g</a:t>
-            </a:r>
-            <a:r>
-              <a:rPr lang="en-US" i="1" dirty="0" err="1" smtClean="0">
-                <a:solidFill>
-                  <a:srgbClr val="CCAF0A"/>
-                </a:solidFill>
-                <a:latin typeface="+mj-lt"/>
-                <a:cs typeface="Rockwell"/>
-              </a:rPr>
-              <a:t>(f(x</a:t>
-            </a:r>
-            <a:r>
-              <a:rPr lang="en-US" i="1" dirty="0" smtClean="0">
-                <a:solidFill>
-                  <a:srgbClr val="CCAF0A"/>
-                </a:solidFill>
-                <a:latin typeface="+mj-lt"/>
-                <a:cs typeface="Rockwell"/>
-              </a:rPr>
-              <a:t>))</a:t>
-            </a:r>
-          </a:p>
-          <a:p>
-            <a:pPr>
-              <a:buFont typeface="Wingdings" charset="2"/>
-              <a:buChar char="§"/>
-            </a:pPr>
-            <a:r>
-              <a:rPr lang="en-US" dirty="0" smtClean="0">
-                <a:latin typeface="+mj-lt"/>
-                <a:cs typeface="Rockwell"/>
-              </a:rPr>
-              <a:t>Combine the functions </a:t>
-            </a:r>
-            <a:r>
-              <a:rPr lang="en-US" dirty="0" err="1" smtClean="0">
-                <a:solidFill>
-                  <a:srgbClr val="FFFFFF"/>
-                </a:solidFill>
-                <a:latin typeface="+mj-lt"/>
-                <a:cs typeface="Rockwell"/>
-              </a:rPr>
-              <a:t>g</a:t>
-            </a:r>
-            <a:r>
-              <a:rPr lang="en-US" dirty="0" smtClean="0">
-                <a:solidFill>
-                  <a:srgbClr val="FFFFFF"/>
-                </a:solidFill>
-                <a:latin typeface="+mj-lt"/>
-                <a:cs typeface="Rockwell"/>
-              </a:rPr>
-              <a:t> and </a:t>
-            </a:r>
-            <a:r>
-              <a:rPr lang="en-US" dirty="0" err="1" smtClean="0">
-                <a:latin typeface="+mj-lt"/>
-                <a:cs typeface="Rockwell"/>
-              </a:rPr>
-              <a:t>f</a:t>
-            </a:r>
-            <a:r>
-              <a:rPr lang="en-US" dirty="0" smtClean="0">
-                <a:latin typeface="+mj-lt"/>
-                <a:cs typeface="Rockwell"/>
-              </a:rPr>
-              <a:t> into a new function that uses the result of </a:t>
-            </a:r>
-            <a:r>
-              <a:rPr lang="en-US" dirty="0" err="1" smtClean="0">
-                <a:latin typeface="+mj-lt"/>
-                <a:cs typeface="Rockwell"/>
-              </a:rPr>
-              <a:t>f(x</a:t>
-            </a:r>
-            <a:r>
-              <a:rPr lang="en-US" dirty="0" smtClean="0">
-                <a:latin typeface="+mj-lt"/>
-                <a:cs typeface="Rockwell"/>
-              </a:rPr>
-              <a:t>) as the input to </a:t>
-            </a:r>
-            <a:r>
-              <a:rPr lang="en-US" dirty="0" err="1" smtClean="0">
-                <a:latin typeface="+mj-lt"/>
-                <a:cs typeface="Rockwell"/>
-              </a:rPr>
-              <a:t>g</a:t>
-            </a:r>
-            <a:r>
-              <a:rPr lang="en-US" dirty="0" smtClean="0">
-                <a:latin typeface="+mj-lt"/>
-                <a:cs typeface="Rockwell"/>
-              </a:rPr>
-              <a:t>.</a:t>
-            </a:r>
+              <a:rPr lang="en-US" dirty="0" smtClean="0"/>
+              <a:t>Let’s </a:t>
+            </a:r>
+            <a:r>
+              <a:rPr lang="en-US" dirty="0" smtClean="0"/>
+              <a:t>glance back at the math</a:t>
+            </a:r>
+            <a:r>
+              <a:rPr lang="en-US" dirty="0" smtClean="0"/>
+              <a:t>…</a:t>
+            </a:r>
+            <a:endParaRPr lang="en-US" i="1" dirty="0" smtClean="0"/>
           </a:p>
         </p:txBody>
       </p:sp>
@@ -4517,7 +4367,7 @@
           <a:p>
             <a:r>
               <a:rPr lang="en-US" dirty="0" smtClean="0"/>
-              <a:t>In JavaScript:</a:t>
+              <a:t>Function Composition</a:t>
             </a:r>
             <a:endParaRPr lang="en-US" dirty="0"/>
           </a:p>
@@ -4525,135 +4375,267 @@
       </p:sp>
       <p:sp>
         <p:nvSpPr>
-          <p:cNvPr id="5" name="TextBox 4"/>
-          <p:cNvSpPr txBox="1"/>
-          <p:nvPr/>
-        </p:nvSpPr>
-        <p:spPr>
-          <a:xfrm>
-            <a:off x="457200" y="1619905"/>
-            <a:ext cx="8178800" cy="2785378"/>
-          </a:xfrm>
-          <a:prstGeom prst="rect">
-            <a:avLst/>
-          </a:prstGeom>
-          <a:noFill/>
-        </p:spPr>
-        <p:txBody>
-          <a:bodyPr wrap="square" rtlCol="0">
-            <a:spAutoFit/>
+          <p:cNvPr id="3" name="Content Placeholder 2"/>
+          <p:cNvSpPr>
+            <a:spLocks noGrp="1"/>
+          </p:cNvSpPr>
+          <p:nvPr>
+            <p:ph idx="1"/>
+          </p:nvPr>
+        </p:nvSpPr>
+        <p:spPr/>
+        <p:txBody>
+          <a:bodyPr>
+            <a:normAutofit/>
           </a:bodyPr>
           <a:lstStyle/>
           <a:p>
-            <a:r>
-              <a:rPr lang="en-US" sz="2500" dirty="0" smtClean="0"/>
-              <a:t>function </a:t>
-            </a:r>
-            <a:r>
-              <a:rPr lang="en-US" sz="2500" dirty="0" err="1" smtClean="0"/>
-              <a:t>compose(f</a:t>
-            </a:r>
-            <a:r>
-              <a:rPr lang="en-US" sz="2500" dirty="0" smtClean="0"/>
-              <a:t>, </a:t>
-            </a:r>
-            <a:r>
-              <a:rPr lang="en-US" sz="2500" dirty="0" err="1" smtClean="0"/>
-              <a:t>g</a:t>
-            </a:r>
-            <a:r>
-              <a:rPr lang="en-US" sz="2500" dirty="0" smtClean="0"/>
-              <a:t>) {</a:t>
-            </a:r>
-          </a:p>
-          <a:p>
-            <a:r>
-              <a:rPr lang="en-US" sz="2500" dirty="0" smtClean="0">
-                <a:solidFill>
-                  <a:schemeClr val="accent1"/>
-                </a:solidFill>
-              </a:rPr>
-              <a:t>  // a closure, closing over the free</a:t>
-            </a:r>
-          </a:p>
-          <a:p>
-            <a:r>
-              <a:rPr lang="en-US" sz="2500" dirty="0" smtClean="0">
-                <a:solidFill>
-                  <a:schemeClr val="accent1"/>
-                </a:solidFill>
-              </a:rPr>
-              <a:t>  // variables </a:t>
-            </a:r>
-            <a:r>
-              <a:rPr lang="en-US" sz="2500" dirty="0" err="1" smtClean="0">
-                <a:solidFill>
-                  <a:schemeClr val="accent1"/>
-                </a:solidFill>
+            <a:pPr>
+              <a:buFont typeface="Wingdings" charset="2"/>
+              <a:buChar char="§"/>
+            </a:pPr>
+            <a:r>
+              <a:rPr lang="en-US" i="1" dirty="0" err="1" smtClean="0">
+                <a:solidFill>
+                  <a:srgbClr val="CCAF0A"/>
+                </a:solidFill>
+                <a:latin typeface="Franklin Gothic Book"/>
+                <a:cs typeface="Franklin Gothic Book"/>
+              </a:rPr>
+              <a:t>y</a:t>
+            </a:r>
+            <a:r>
+              <a:rPr lang="en-US" i="1" dirty="0" smtClean="0">
+                <a:solidFill>
+                  <a:srgbClr val="CCAF0A"/>
+                </a:solidFill>
+                <a:latin typeface="Franklin Gothic Book"/>
+                <a:cs typeface="Franklin Gothic Book"/>
+              </a:rPr>
+              <a:t> = </a:t>
+            </a:r>
+            <a:r>
+              <a:rPr lang="en-US" i="1" dirty="0" err="1" smtClean="0">
+                <a:solidFill>
+                  <a:srgbClr val="CCAF0A"/>
+                </a:solidFill>
+                <a:latin typeface="Franklin Gothic Book"/>
+                <a:cs typeface="Franklin Gothic Book"/>
+              </a:rPr>
+              <a:t>f(x</a:t>
+            </a:r>
+            <a:r>
+              <a:rPr lang="en-US" i="1" dirty="0" smtClean="0">
+                <a:solidFill>
+                  <a:srgbClr val="CCAF0A"/>
+                </a:solidFill>
+                <a:latin typeface="Franklin Gothic Book"/>
+                <a:cs typeface="Franklin Gothic Book"/>
+              </a:rPr>
+              <a:t>) </a:t>
+            </a:r>
+            <a:r>
+              <a:rPr lang="en-US" dirty="0" smtClean="0">
+                <a:latin typeface="Franklin Gothic Book"/>
+                <a:cs typeface="Franklin Gothic Book"/>
+              </a:rPr>
+              <a:t>or </a:t>
+            </a:r>
+            <a:r>
+              <a:rPr lang="en-US" i="1" dirty="0" err="1" smtClean="0">
+                <a:solidFill>
+                  <a:srgbClr val="CCAF0A"/>
+                </a:solidFill>
+                <a:latin typeface="Franklin Gothic Book"/>
+                <a:cs typeface="Franklin Gothic Book"/>
               </a:rPr>
               <a:t>f</a:t>
             </a:r>
             <a:r>
-              <a:rPr lang="en-US" sz="2500" dirty="0" smtClean="0">
-                <a:solidFill>
-                  <a:schemeClr val="accent1"/>
-                </a:solidFill>
-              </a:rPr>
-              <a:t> and </a:t>
-            </a:r>
-            <a:r>
-              <a:rPr lang="en-US" sz="2500" dirty="0" err="1" smtClean="0">
-                <a:solidFill>
-                  <a:schemeClr val="accent1"/>
-                </a:solidFill>
-              </a:rPr>
-              <a:t>g</a:t>
-            </a:r>
-            <a:endParaRPr lang="en-US" sz="2500" dirty="0" smtClean="0">
+              <a:rPr lang="en-US" i="1" dirty="0" smtClean="0">
+                <a:solidFill>
+                  <a:srgbClr val="CCAF0A"/>
+                </a:solidFill>
+                <a:latin typeface="Franklin Gothic Book"/>
+                <a:cs typeface="Franklin Gothic Book"/>
+              </a:rPr>
+              <a:t>: </a:t>
+            </a:r>
+            <a:r>
+              <a:rPr lang="en-US" i="1" dirty="0" err="1" smtClean="0">
+                <a:solidFill>
+                  <a:srgbClr val="CCAF0A"/>
+                </a:solidFill>
+                <a:latin typeface="Franklin Gothic Book"/>
+                <a:cs typeface="Franklin Gothic Book"/>
+              </a:rPr>
+              <a:t>x</a:t>
+            </a:r>
+            <a:r>
+              <a:rPr lang="en-US" i="1" dirty="0" smtClean="0">
+                <a:solidFill>
+                  <a:srgbClr val="CCAF0A"/>
+                </a:solidFill>
+                <a:latin typeface="Franklin Gothic Book"/>
+                <a:cs typeface="Franklin Gothic Book"/>
+              </a:rPr>
+              <a:t> -&gt; </a:t>
+            </a:r>
+            <a:r>
+              <a:rPr lang="en-US" i="1" dirty="0" err="1" smtClean="0">
+                <a:solidFill>
+                  <a:srgbClr val="CCAF0A"/>
+                </a:solidFill>
+                <a:latin typeface="Franklin Gothic Book"/>
+                <a:cs typeface="Franklin Gothic Book"/>
+              </a:rPr>
+              <a:t>y</a:t>
+            </a:r>
+            <a:endParaRPr lang="en-US" i="1" dirty="0" smtClean="0">
               <a:solidFill>
-                <a:schemeClr val="accent1"/>
+                <a:srgbClr val="CCAF0A"/>
               </a:solidFill>
+              <a:latin typeface="Franklin Gothic Book"/>
+              <a:cs typeface="Franklin Gothic Book"/>
             </a:endParaRPr>
           </a:p>
           <a:p>
-            <a:r>
-              <a:rPr lang="en-US" sz="2500" dirty="0" smtClean="0"/>
-              <a:t>  return </a:t>
-            </a:r>
-            <a:r>
-              <a:rPr lang="en-US" sz="2500" dirty="0" err="1" smtClean="0"/>
-              <a:t>function(x</a:t>
-            </a:r>
-            <a:r>
-              <a:rPr lang="en-US" sz="2500" dirty="0" smtClean="0"/>
-              <a:t>) {</a:t>
-            </a:r>
-          </a:p>
-          <a:p>
-            <a:r>
-              <a:rPr lang="en-US" sz="2500" dirty="0" smtClean="0"/>
-              <a:t>    return </a:t>
-            </a:r>
-            <a:r>
-              <a:rPr lang="en-US" sz="2500" dirty="0" err="1" smtClean="0"/>
-              <a:t>g(f(x</a:t>
-            </a:r>
-            <a:r>
-              <a:rPr lang="en-US" sz="2500" dirty="0" smtClean="0"/>
-              <a:t>));</a:t>
-            </a:r>
-          </a:p>
-          <a:p>
-            <a:r>
-              <a:rPr lang="en-US" sz="2500" dirty="0" smtClean="0"/>
-              <a:t>  }</a:t>
-            </a:r>
-          </a:p>
-          <a:p>
-            <a:r>
-              <a:rPr lang="en-US" sz="2500" dirty="0" smtClean="0"/>
-              <a:t>}</a:t>
-            </a:r>
+            <a:pPr>
+              <a:buFont typeface="Wingdings" charset="2"/>
+              <a:buChar char="§"/>
+            </a:pPr>
+            <a:r>
+              <a:rPr lang="en-US" dirty="0" smtClean="0">
+                <a:latin typeface="Franklin Gothic Book"/>
+                <a:cs typeface="Franklin Gothic Book"/>
+              </a:rPr>
+              <a:t>“</a:t>
+            </a:r>
+            <a:r>
+              <a:rPr lang="en-US" dirty="0" err="1" smtClean="0">
+                <a:latin typeface="Franklin Gothic Book"/>
+                <a:cs typeface="Franklin Gothic Book"/>
+              </a:rPr>
+              <a:t>y</a:t>
+            </a:r>
+            <a:r>
+              <a:rPr lang="en-US" dirty="0" smtClean="0">
+                <a:latin typeface="Franklin Gothic Book"/>
+                <a:cs typeface="Franklin Gothic Book"/>
+              </a:rPr>
+              <a:t> is a function of </a:t>
+            </a:r>
+            <a:r>
+              <a:rPr lang="en-US" dirty="0" err="1" smtClean="0">
+                <a:latin typeface="Franklin Gothic Book"/>
+                <a:cs typeface="Franklin Gothic Book"/>
+              </a:rPr>
+              <a:t>x</a:t>
+            </a:r>
+            <a:r>
+              <a:rPr lang="en-US" dirty="0" smtClean="0">
+                <a:latin typeface="Franklin Gothic Book"/>
+                <a:cs typeface="Franklin Gothic Book"/>
+              </a:rPr>
+              <a:t>”</a:t>
+            </a:r>
+          </a:p>
+          <a:p>
+            <a:pPr lvl="1">
+              <a:buFont typeface="Wingdings" charset="2"/>
+              <a:buChar char="§"/>
+            </a:pPr>
+            <a:r>
+              <a:rPr lang="en-US" dirty="0" smtClean="0">
+                <a:latin typeface="Franklin Gothic Book"/>
+                <a:cs typeface="Franklin Gothic Book"/>
+              </a:rPr>
+              <a:t>The value of</a:t>
+            </a:r>
+            <a:r>
+              <a:rPr lang="en-US" dirty="0" smtClean="0">
+                <a:latin typeface="Franklin Gothic Book"/>
+                <a:cs typeface="Franklin Gothic Book"/>
+              </a:rPr>
+              <a:t> </a:t>
+            </a:r>
+            <a:r>
+              <a:rPr lang="en-US" dirty="0" err="1" smtClean="0">
+                <a:latin typeface="Franklin Gothic Book"/>
+                <a:cs typeface="Franklin Gothic Book"/>
+              </a:rPr>
+              <a:t>y</a:t>
+            </a:r>
+            <a:r>
+              <a:rPr lang="en-US" dirty="0" smtClean="0">
+                <a:latin typeface="Franklin Gothic Book"/>
+                <a:cs typeface="Franklin Gothic Book"/>
+              </a:rPr>
+              <a:t> </a:t>
+            </a:r>
+            <a:r>
+              <a:rPr lang="en-US" dirty="0" smtClean="0">
+                <a:latin typeface="Franklin Gothic Book"/>
+                <a:cs typeface="Franklin Gothic Book"/>
+              </a:rPr>
+              <a:t>depends </a:t>
+            </a:r>
+            <a:r>
+              <a:rPr lang="en-US" dirty="0" smtClean="0">
+                <a:latin typeface="Franklin Gothic Book"/>
+                <a:cs typeface="Franklin Gothic Book"/>
+              </a:rPr>
+              <a:t>on </a:t>
+            </a:r>
+            <a:r>
+              <a:rPr lang="en-US" dirty="0" err="1" smtClean="0">
+                <a:latin typeface="Franklin Gothic Book"/>
+                <a:cs typeface="Franklin Gothic Book"/>
+              </a:rPr>
+              <a:t>x</a:t>
+            </a:r>
+            <a:r>
+              <a:rPr lang="en-US" dirty="0" smtClean="0">
+                <a:latin typeface="Franklin Gothic Book"/>
+                <a:cs typeface="Franklin Gothic Book"/>
+              </a:rPr>
+              <a:t>; a simple mapping from one value, </a:t>
+            </a:r>
+            <a:r>
+              <a:rPr lang="en-US" dirty="0" err="1" smtClean="0">
+                <a:latin typeface="Franklin Gothic Book"/>
+                <a:cs typeface="Franklin Gothic Book"/>
+              </a:rPr>
+              <a:t>x</a:t>
+            </a:r>
+            <a:r>
+              <a:rPr lang="en-US" dirty="0" smtClean="0">
+                <a:latin typeface="Franklin Gothic Book"/>
+                <a:cs typeface="Franklin Gothic Book"/>
+              </a:rPr>
+              <a:t>, to another, </a:t>
+            </a:r>
+            <a:r>
+              <a:rPr lang="en-US" dirty="0" err="1" smtClean="0">
+                <a:latin typeface="Franklin Gothic Book"/>
+                <a:cs typeface="Franklin Gothic Book"/>
+              </a:rPr>
+              <a:t>y</a:t>
+            </a:r>
+            <a:r>
+              <a:rPr lang="en-US" dirty="0" smtClean="0">
+                <a:latin typeface="Franklin Gothic Book"/>
+                <a:cs typeface="Franklin Gothic Book"/>
+              </a:rPr>
+              <a:t>.</a:t>
+            </a:r>
+            <a:endParaRPr lang="en-US" i="1" dirty="0" smtClean="0">
+              <a:solidFill>
+                <a:srgbClr val="CCAF0A"/>
+              </a:solidFill>
+              <a:latin typeface="Franklin Gothic Book"/>
+              <a:cs typeface="Franklin Gothic Book"/>
+            </a:endParaRPr>
           </a:p>
         </p:txBody>
       </p:sp>
@@ -4706,15 +4688,7 @@
           <a:p>
             <a:r>
               <a:rPr lang="en-US" dirty="0" smtClean="0"/>
-              <a:t>In </a:t>
-            </a:r>
-            <a:r>
-              <a:rPr lang="en-US" dirty="0" err="1" smtClean="0"/>
-              <a:t>Scala</a:t>
-            </a:r>
-            <a:r>
-              <a:rPr lang="en-US" dirty="0" smtClean="0"/>
-              <a:t>:</a:t>
+              <a:t>Function Composition</a:t>
             </a:r>
             <a:endParaRPr lang="en-US" dirty="0"/>
           </a:p>
@@ -4722,84 +4696,418 @@
       </p:sp>
       <p:sp>
         <p:nvSpPr>
-          <p:cNvPr id="6" name="TextBox 5"/>
-          <p:cNvSpPr txBox="1"/>
-          <p:nvPr/>
-        </p:nvSpPr>
-        <p:spPr>
-          <a:xfrm>
-            <a:off x="457200" y="1572381"/>
-            <a:ext cx="6448431" cy="861774"/>
-          </a:xfrm>
-          <a:prstGeom prst="rect">
-            <a:avLst/>
-          </a:prstGeom>
-          <a:noFill/>
-        </p:spPr>
-        <p:txBody>
-          <a:bodyPr wrap="none" rtlCol="0">
-            <a:spAutoFit/>
+          <p:cNvPr id="3" name="Content Placeholder 2"/>
+          <p:cNvSpPr>
+            <a:spLocks noGrp="1"/>
+          </p:cNvSpPr>
+          <p:nvPr>
+            <p:ph idx="1"/>
+          </p:nvPr>
+        </p:nvSpPr>
+        <p:spPr/>
+        <p:txBody>
+          <a:bodyPr>
+            <a:normAutofit/>
           </a:bodyPr>
           <a:lstStyle/>
           <a:p>
-            <a:r>
-              <a:rPr lang="en-US" sz="2500" dirty="0" smtClean="0"/>
-              <a:t>def </a:t>
-            </a:r>
-            <a:r>
-              <a:rPr lang="en-US" sz="2500" dirty="0" err="1" smtClean="0"/>
-              <a:t>compose[A</a:t>
-            </a:r>
-            <a:r>
-              <a:rPr lang="en-US" sz="2500" dirty="0" smtClean="0"/>
-              <a:t>, B, </a:t>
-            </a:r>
-            <a:r>
-              <a:rPr lang="en-US" sz="2500" dirty="0" err="1" smtClean="0"/>
-              <a:t>C](g</a:t>
-            </a:r>
-            <a:r>
-              <a:rPr lang="en-US" sz="2500" dirty="0" smtClean="0"/>
-              <a:t>: B =&gt; C, </a:t>
-            </a:r>
-            <a:r>
-              <a:rPr lang="en-US" sz="2500" dirty="0" err="1" smtClean="0"/>
+            <a:pPr>
+              <a:buFont typeface="Wingdings" charset="2"/>
+              <a:buChar char="§"/>
+            </a:pPr>
+            <a:r>
+              <a:rPr lang="en-US" i="1" dirty="0" smtClean="0">
+                <a:solidFill>
+                  <a:srgbClr val="CCAF0A"/>
+                </a:solidFill>
+                <a:latin typeface="Franklin Gothic Book"/>
+                <a:cs typeface="Franklin Gothic Book"/>
+              </a:rPr>
+              <a:t>y</a:t>
+            </a:r>
+            <a:r>
+              <a:rPr lang="en-US" i="1" dirty="0" smtClean="0">
+                <a:solidFill>
+                  <a:srgbClr val="CCAF0A"/>
+                </a:solidFill>
+                <a:latin typeface="Franklin Gothic Book"/>
+                <a:cs typeface="Franklin Gothic Book"/>
+              </a:rPr>
+              <a:t> = </a:t>
+            </a:r>
+            <a:r>
+              <a:rPr lang="en-US" i="1" dirty="0" err="1" smtClean="0">
+                <a:solidFill>
+                  <a:srgbClr val="CCAF0A"/>
+                </a:solidFill>
+                <a:latin typeface="Franklin Gothic Book"/>
+                <a:cs typeface="Franklin Gothic Book"/>
+              </a:rPr>
+              <a:t>f(x</a:t>
+            </a:r>
+            <a:r>
+              <a:rPr lang="en-US" i="1" dirty="0" smtClean="0">
+                <a:solidFill>
+                  <a:srgbClr val="CCAF0A"/>
+                </a:solidFill>
+                <a:latin typeface="Franklin Gothic Book"/>
+                <a:cs typeface="Franklin Gothic Book"/>
+              </a:rPr>
+              <a:t>) </a:t>
+            </a:r>
+            <a:r>
+              <a:rPr lang="en-US" dirty="0" smtClean="0">
+                <a:latin typeface="Franklin Gothic Book"/>
+                <a:cs typeface="Franklin Gothic Book"/>
+              </a:rPr>
+              <a:t>or </a:t>
+            </a:r>
+            <a:r>
+              <a:rPr lang="en-US" i="1" dirty="0" err="1" smtClean="0">
+                <a:solidFill>
+                  <a:srgbClr val="CCAF0A"/>
+                </a:solidFill>
+                <a:latin typeface="Franklin Gothic Book"/>
+                <a:cs typeface="Franklin Gothic Book"/>
+              </a:rPr>
               <a:t>f</a:t>
             </a:r>
             <a:r>
-              <a:rPr lang="en-US" sz="2500" dirty="0" smtClean="0"/>
-              <a:t>: A =&gt; B) =</a:t>
-            </a:r>
-          </a:p>
-          <a:p>
-            <a:r>
-              <a:rPr lang="en-US" sz="2500" dirty="0" smtClean="0"/>
-              <a:t>  (</a:t>
-            </a:r>
-            <a:r>
-              <a:rPr lang="en-US" sz="2500" dirty="0" err="1" smtClean="0"/>
+              <a:rPr lang="en-US" i="1" dirty="0" smtClean="0">
+                <a:solidFill>
+                  <a:srgbClr val="CCAF0A"/>
+                </a:solidFill>
+                <a:latin typeface="Franklin Gothic Book"/>
+                <a:cs typeface="Franklin Gothic Book"/>
+              </a:rPr>
+              <a:t>: </a:t>
+            </a:r>
+            <a:r>
+              <a:rPr lang="en-US" i="1" dirty="0" err="1" smtClean="0">
+                <a:solidFill>
+                  <a:srgbClr val="CCAF0A"/>
+                </a:solidFill>
+                <a:latin typeface="Franklin Gothic Book"/>
+                <a:cs typeface="Franklin Gothic Book"/>
+              </a:rPr>
               <a:t>x</a:t>
             </a:r>
             <a:r>
-              <a:rPr lang="en-US" sz="2500" dirty="0" smtClean="0"/>
-              <a:t>: A) =&gt; </a:t>
-            </a:r>
-            <a:r>
-              <a:rPr lang="en-US" sz="2500" dirty="0" err="1" smtClean="0"/>
-              <a:t>g(f(x</a:t>
-            </a:r>
-            <a:r>
-              <a:rPr lang="en-US" sz="2500" dirty="0" smtClean="0"/>
-              <a:t>)) </a:t>
-            </a:r>
-            <a:r>
-              <a:rPr lang="en-US" sz="2500" dirty="0" smtClean="0">
-                <a:solidFill>
-                  <a:srgbClr val="6EA0B0"/>
-                </a:solidFill>
-              </a:rPr>
-              <a:t>// the closure</a:t>
-            </a:r>
+              <a:rPr lang="en-US" i="1" dirty="0" smtClean="0">
+                <a:solidFill>
+                  <a:srgbClr val="CCAF0A"/>
+                </a:solidFill>
+                <a:latin typeface="Franklin Gothic Book"/>
+                <a:cs typeface="Franklin Gothic Book"/>
+              </a:rPr>
+              <a:t> -&gt; </a:t>
+            </a:r>
+            <a:r>
+              <a:rPr lang="en-US" i="1" dirty="0" err="1" smtClean="0">
+                <a:solidFill>
+                  <a:srgbClr val="CCAF0A"/>
+                </a:solidFill>
+                <a:latin typeface="Franklin Gothic Book"/>
+                <a:cs typeface="Franklin Gothic Book"/>
+              </a:rPr>
+              <a:t>y</a:t>
+            </a:r>
+            <a:endParaRPr lang="en-US" i="1" dirty="0" smtClean="0">
+              <a:solidFill>
+                <a:srgbClr val="CCAF0A"/>
+              </a:solidFill>
+              <a:latin typeface="Franklin Gothic Book"/>
+              <a:cs typeface="Franklin Gothic Book"/>
+            </a:endParaRPr>
+          </a:p>
+          <a:p>
+            <a:pPr>
+              <a:buFont typeface="Wingdings" charset="2"/>
+              <a:buChar char="§"/>
+            </a:pPr>
+            <a:r>
+              <a:rPr lang="en-US" dirty="0" smtClean="0">
+                <a:latin typeface="Franklin Gothic Book"/>
+                <a:cs typeface="Franklin Gothic Book"/>
+              </a:rPr>
+              <a:t>“</a:t>
+            </a:r>
+            <a:r>
+              <a:rPr lang="en-US" dirty="0" err="1" smtClean="0">
+                <a:latin typeface="Franklin Gothic Book"/>
+                <a:cs typeface="Franklin Gothic Book"/>
+              </a:rPr>
+              <a:t>y</a:t>
+            </a:r>
+            <a:r>
+              <a:rPr lang="en-US" dirty="0" smtClean="0">
+                <a:latin typeface="Franklin Gothic Book"/>
+                <a:cs typeface="Franklin Gothic Book"/>
+              </a:rPr>
+              <a:t> is a function of </a:t>
+            </a:r>
+            <a:r>
+              <a:rPr lang="en-US" dirty="0" err="1" smtClean="0">
+                <a:latin typeface="Franklin Gothic Book"/>
+                <a:cs typeface="Franklin Gothic Book"/>
+              </a:rPr>
+              <a:t>x</a:t>
+            </a:r>
+            <a:r>
+              <a:rPr lang="en-US" dirty="0" smtClean="0">
+                <a:latin typeface="Franklin Gothic Book"/>
+                <a:cs typeface="Franklin Gothic Book"/>
+              </a:rPr>
+              <a:t>”</a:t>
+            </a:r>
+          </a:p>
+          <a:p>
+            <a:pPr lvl="1">
+              <a:buFont typeface="Wingdings" charset="2"/>
+              <a:buChar char="§"/>
+            </a:pPr>
+            <a:r>
+              <a:rPr lang="en-US" dirty="0" smtClean="0">
+                <a:latin typeface="Franklin Gothic Book"/>
+                <a:cs typeface="Franklin Gothic Book"/>
+              </a:rPr>
+              <a:t>The value of</a:t>
+            </a:r>
+            <a:r>
+              <a:rPr lang="en-US" dirty="0" smtClean="0">
+                <a:latin typeface="Franklin Gothic Book"/>
+                <a:cs typeface="Franklin Gothic Book"/>
+              </a:rPr>
+              <a:t> </a:t>
+            </a:r>
+            <a:r>
+              <a:rPr lang="en-US" dirty="0" err="1" smtClean="0">
+                <a:latin typeface="Franklin Gothic Book"/>
+                <a:cs typeface="Franklin Gothic Book"/>
+              </a:rPr>
+              <a:t>y</a:t>
+            </a:r>
+            <a:r>
+              <a:rPr lang="en-US" dirty="0" smtClean="0">
+                <a:latin typeface="Franklin Gothic Book"/>
+                <a:cs typeface="Franklin Gothic Book"/>
+              </a:rPr>
+              <a:t> </a:t>
+            </a:r>
+            <a:r>
+              <a:rPr lang="en-US" dirty="0" smtClean="0">
+                <a:latin typeface="Franklin Gothic Book"/>
+                <a:cs typeface="Franklin Gothic Book"/>
+              </a:rPr>
+              <a:t>depends </a:t>
+            </a:r>
+            <a:r>
+              <a:rPr lang="en-US" dirty="0" smtClean="0">
+                <a:latin typeface="Franklin Gothic Book"/>
+                <a:cs typeface="Franklin Gothic Book"/>
+              </a:rPr>
+              <a:t>on </a:t>
+            </a:r>
+            <a:r>
+              <a:rPr lang="en-US" dirty="0" err="1" smtClean="0">
+                <a:latin typeface="Franklin Gothic Book"/>
+                <a:cs typeface="Franklin Gothic Book"/>
+              </a:rPr>
+              <a:t>x</a:t>
+            </a:r>
+            <a:r>
+              <a:rPr lang="en-US" dirty="0" smtClean="0">
+                <a:latin typeface="Franklin Gothic Book"/>
+                <a:cs typeface="Franklin Gothic Book"/>
+              </a:rPr>
+              <a:t>; a simple mapping from one value, </a:t>
+            </a:r>
+            <a:r>
+              <a:rPr lang="en-US" dirty="0" err="1" smtClean="0">
+                <a:latin typeface="Franklin Gothic Book"/>
+                <a:cs typeface="Franklin Gothic Book"/>
+              </a:rPr>
+              <a:t>x</a:t>
+            </a:r>
+            <a:r>
+              <a:rPr lang="en-US" dirty="0" smtClean="0">
+                <a:latin typeface="Franklin Gothic Book"/>
+                <a:cs typeface="Franklin Gothic Book"/>
+              </a:rPr>
+              <a:t>, to another, </a:t>
+            </a:r>
+            <a:r>
+              <a:rPr lang="en-US" dirty="0" err="1" smtClean="0">
+                <a:latin typeface="Franklin Gothic Book"/>
+                <a:cs typeface="Franklin Gothic Book"/>
+              </a:rPr>
+              <a:t>y</a:t>
+            </a:r>
+            <a:r>
+              <a:rPr lang="en-US" dirty="0" smtClean="0">
+                <a:latin typeface="Franklin Gothic Book"/>
+                <a:cs typeface="Franklin Gothic Book"/>
+              </a:rPr>
+              <a:t>.</a:t>
+            </a:r>
+            <a:endParaRPr lang="en-US" i="1" dirty="0" smtClean="0">
+              <a:solidFill>
+                <a:srgbClr val="CCAF0A"/>
+              </a:solidFill>
+              <a:latin typeface="Franklin Gothic Book"/>
+              <a:cs typeface="Franklin Gothic Book"/>
+            </a:endParaRPr>
+          </a:p>
+          <a:p>
+            <a:pPr>
+              <a:buFont typeface="Wingdings" charset="2"/>
+              <a:buChar char="§"/>
+            </a:pPr>
+            <a:r>
+              <a:rPr lang="en-US" i="1" dirty="0" err="1" smtClean="0">
+                <a:solidFill>
+                  <a:srgbClr val="CCAF0A"/>
+                </a:solidFill>
+                <a:latin typeface="Franklin Gothic Book"/>
+                <a:cs typeface="Franklin Gothic Book"/>
+              </a:rPr>
+              <a:t>f</a:t>
+            </a:r>
+            <a:r>
+              <a:rPr lang="en-US" i="1" dirty="0" smtClean="0">
+                <a:solidFill>
+                  <a:srgbClr val="CCAF0A"/>
+                </a:solidFill>
+                <a:latin typeface="Franklin Gothic Book"/>
+                <a:cs typeface="Franklin Gothic Book"/>
+              </a:rPr>
+              <a:t>: </a:t>
+            </a:r>
+            <a:r>
+              <a:rPr lang="en-US" i="1" dirty="0" err="1" smtClean="0">
+                <a:solidFill>
+                  <a:srgbClr val="CCAF0A"/>
+                </a:solidFill>
+                <a:latin typeface="Franklin Gothic Book"/>
+                <a:cs typeface="Franklin Gothic Book"/>
+              </a:rPr>
+              <a:t>x</a:t>
+            </a:r>
+            <a:r>
+              <a:rPr lang="en-US" i="1" dirty="0" smtClean="0">
+                <a:solidFill>
+                  <a:srgbClr val="CCAF0A"/>
+                </a:solidFill>
+                <a:latin typeface="Franklin Gothic Book"/>
+                <a:cs typeface="Franklin Gothic Book"/>
+              </a:rPr>
+              <a:t> -&gt; </a:t>
+            </a:r>
+            <a:r>
+              <a:rPr lang="en-US" i="1" dirty="0" err="1" smtClean="0">
+                <a:solidFill>
+                  <a:srgbClr val="CCAF0A"/>
+                </a:solidFill>
+                <a:latin typeface="Franklin Gothic Book"/>
+                <a:cs typeface="Franklin Gothic Book"/>
+              </a:rPr>
+              <a:t>y</a:t>
+            </a:r>
+            <a:r>
+              <a:rPr lang="en-US" i="1" dirty="0" smtClean="0">
+                <a:solidFill>
+                  <a:srgbClr val="CCAF0A"/>
+                </a:solidFill>
+                <a:latin typeface="Franklin Gothic Book"/>
+                <a:cs typeface="Franklin Gothic Book"/>
+              </a:rPr>
+              <a:t> </a:t>
+            </a:r>
+            <a:r>
+              <a:rPr lang="en-US" dirty="0" smtClean="0">
+                <a:latin typeface="Franklin Gothic Book"/>
+                <a:cs typeface="Franklin Gothic Book"/>
+              </a:rPr>
+              <a:t>and </a:t>
+            </a:r>
+            <a:r>
+              <a:rPr lang="en-US" i="1" dirty="0" err="1" smtClean="0">
+                <a:solidFill>
+                  <a:srgbClr val="CCAF0A"/>
+                </a:solidFill>
+                <a:latin typeface="Franklin Gothic Book"/>
+                <a:cs typeface="Franklin Gothic Book"/>
+              </a:rPr>
+              <a:t>g</a:t>
+            </a:r>
+            <a:r>
+              <a:rPr lang="en-US" i="1" dirty="0" smtClean="0">
+                <a:solidFill>
+                  <a:srgbClr val="CCAF0A"/>
+                </a:solidFill>
+                <a:latin typeface="Franklin Gothic Book"/>
+                <a:cs typeface="Franklin Gothic Book"/>
+              </a:rPr>
+              <a:t>: </a:t>
+            </a:r>
+            <a:r>
+              <a:rPr lang="en-US" i="1" dirty="0" err="1" smtClean="0">
+                <a:solidFill>
+                  <a:srgbClr val="CCAF0A"/>
+                </a:solidFill>
+                <a:latin typeface="Franklin Gothic Book"/>
+                <a:cs typeface="Franklin Gothic Book"/>
+              </a:rPr>
+              <a:t>y</a:t>
+            </a:r>
+            <a:r>
+              <a:rPr lang="en-US" i="1" dirty="0" smtClean="0">
+                <a:solidFill>
+                  <a:srgbClr val="CCAF0A"/>
+                </a:solidFill>
+                <a:latin typeface="Franklin Gothic Book"/>
+                <a:cs typeface="Franklin Gothic Book"/>
+              </a:rPr>
+              <a:t> -&gt; </a:t>
+            </a:r>
+            <a:r>
+              <a:rPr lang="en-US" i="1" dirty="0" err="1" smtClean="0">
+                <a:solidFill>
+                  <a:srgbClr val="CCAF0A"/>
+                </a:solidFill>
+                <a:latin typeface="Franklin Gothic Book"/>
+                <a:cs typeface="Franklin Gothic Book"/>
+              </a:rPr>
+              <a:t>z</a:t>
+            </a:r>
+            <a:endParaRPr lang="en-US" i="1" dirty="0" smtClean="0">
+              <a:solidFill>
+                <a:srgbClr val="CCAF0A"/>
+              </a:solidFill>
+              <a:latin typeface="Franklin Gothic Book"/>
+              <a:cs typeface="Franklin Gothic Book"/>
+            </a:endParaRPr>
+          </a:p>
+          <a:p>
+            <a:pPr>
+              <a:buFont typeface="Wingdings" charset="2"/>
+              <a:buChar char="§"/>
+            </a:pPr>
+            <a:r>
+              <a:rPr lang="en-US" dirty="0" smtClean="0">
+                <a:cs typeface="Rockwell"/>
+              </a:rPr>
+              <a:t>The domains of these functions are suitable for composition</a:t>
+            </a:r>
+            <a:r>
+              <a:rPr lang="en-US" dirty="0" smtClean="0">
+                <a:cs typeface="Rockwell"/>
+              </a:rPr>
+              <a:t>.</a:t>
+            </a:r>
+            <a:endParaRPr lang="en-US" dirty="0" smtClean="0">
+              <a:cs typeface="Rockwell"/>
+            </a:endParaRPr>
           </a:p>
         </p:txBody>
       </p:sp>
@@ -4852,7 +5160,7 @@
           <a:p>
             <a:r>
               <a:rPr lang="en-US" dirty="0" smtClean="0"/>
-              <a:t>Higher-Order Functions</a:t>
+              <a:t>Function Composition</a:t>
             </a:r>
             <a:endParaRPr lang="en-US" dirty="0"/>
           </a:p>
@@ -4870,7 +5178,9 @@
         </p:nvSpPr>
         <p:spPr/>
         <p:txBody>
-          <a:bodyPr/>
+          <a:bodyPr>
+            <a:normAutofit/>
+          </a:bodyPr>
           <a:lstStyle/>
           <a:p>
             <a:pPr>
@@ -4878,9 +5188,23 @@
               <a:buChar char="§"/>
             </a:pPr>
             <a:r>
-              <a:rPr lang="en-US" dirty="0" smtClean="0"/>
-              <a:t>A function that takes another function as an argument and/or returns a function as its result.</a:t>
-            </a:r>
+              <a:rPr lang="en-US" dirty="0" smtClean="0">
+                <a:latin typeface="+mj-lt"/>
+                <a:cs typeface="Rockwell"/>
+              </a:rPr>
+              <a:t>We can combine functions with compatible </a:t>
+            </a:r>
+            <a:r>
+              <a:rPr lang="en-US" dirty="0" smtClean="0">
+                <a:latin typeface="+mj-lt"/>
+                <a:cs typeface="Rockwell"/>
+              </a:rPr>
+              <a:t>domains.</a:t>
+            </a:r>
+            <a:endParaRPr lang="en-US" dirty="0" smtClean="0">
+              <a:latin typeface="+mj-lt"/>
+              <a:cs typeface="Rockwell"/>
+            </a:endParaRPr>
           </a:p>
           <a:p>
             <a:pPr>
@@ -4888,9 +5212,208 @@
               <a:buChar char="§"/>
             </a:pPr>
             <a:r>
-              <a:rPr lang="en-US" dirty="0" smtClean="0"/>
-              <a:t>Ruby, via Rails, brought list-bound implementations of higher-order functions mainstream.</a:t>
-            </a:r>
+              <a:rPr lang="en-US" i="1" dirty="0" smtClean="0">
+                <a:solidFill>
+                  <a:srgbClr val="CCAF0A"/>
+                </a:solidFill>
+                <a:latin typeface="+mj-lt"/>
+                <a:cs typeface="Rockwell"/>
+              </a:rPr>
+              <a:t>(</a:t>
+            </a:r>
+            <a:r>
+              <a:rPr lang="en-US" i="1" dirty="0" err="1" smtClean="0">
+                <a:solidFill>
+                  <a:srgbClr val="CCAF0A"/>
+                </a:solidFill>
+                <a:latin typeface="+mj-lt"/>
+                <a:cs typeface="Rockwell"/>
+              </a:rPr>
+              <a:t>g</a:t>
+            </a:r>
+            <a:r>
+              <a:rPr lang="en-US" i="1" dirty="0" smtClean="0">
+                <a:solidFill>
+                  <a:srgbClr val="CCAF0A"/>
+                </a:solidFill>
+                <a:latin typeface="+mj-lt"/>
+                <a:cs typeface="Rockwell"/>
+              </a:rPr>
+              <a:t> </a:t>
+            </a:r>
+            <a:r>
+              <a:rPr lang="en-US" i="1" dirty="0" smtClean="0">
+                <a:solidFill>
+                  <a:srgbClr val="CCAF0A"/>
+                </a:solidFill>
+                <a:latin typeface="+mj-lt"/>
+                <a:cs typeface="Rockwell"/>
+              </a:rPr>
+              <a:t>.</a:t>
+            </a:r>
+            <a:r>
+              <a:rPr lang="en-US" i="1" dirty="0" smtClean="0">
+                <a:solidFill>
+                  <a:srgbClr val="CCAF0A"/>
+                </a:solidFill>
+                <a:latin typeface="+mj-lt"/>
+                <a:cs typeface="Rockwell"/>
+              </a:rPr>
+              <a:t> </a:t>
+            </a:r>
+            <a:r>
+              <a:rPr lang="en-US" i="1" dirty="0" err="1" smtClean="0">
+                <a:solidFill>
+                  <a:srgbClr val="CCAF0A"/>
+                </a:solidFill>
+                <a:latin typeface="+mj-lt"/>
+                <a:cs typeface="Rockwell"/>
+              </a:rPr>
+              <a:t>f</a:t>
+            </a:r>
+            <a:r>
+              <a:rPr lang="en-US" i="1" dirty="0" smtClean="0">
+                <a:solidFill>
+                  <a:srgbClr val="CCAF0A"/>
+                </a:solidFill>
+                <a:latin typeface="+mj-lt"/>
+                <a:cs typeface="Rockwell"/>
+              </a:rPr>
+              <a:t>) = </a:t>
+            </a:r>
+            <a:r>
+              <a:rPr lang="en-US" i="1" dirty="0" err="1" smtClean="0">
+                <a:solidFill>
+                  <a:srgbClr val="CCAF0A"/>
+                </a:solidFill>
+                <a:latin typeface="+mj-lt"/>
+                <a:cs typeface="Rockwell"/>
+              </a:rPr>
+              <a:t>g(f(x</a:t>
+            </a:r>
+            <a:r>
+              <a:rPr lang="en-US" i="1" dirty="0" smtClean="0">
+                <a:solidFill>
+                  <a:srgbClr val="CCAF0A"/>
+                </a:solidFill>
+                <a:latin typeface="+mj-lt"/>
+                <a:cs typeface="Rockwell"/>
+              </a:rPr>
+              <a:t>)</a:t>
+            </a:r>
+            <a:r>
+              <a:rPr lang="en-US" i="1" dirty="0" smtClean="0">
+                <a:solidFill>
+                  <a:srgbClr val="CCAF0A"/>
+                </a:solidFill>
+                <a:latin typeface="+mj-lt"/>
+                <a:cs typeface="Rockwell"/>
+              </a:rPr>
+              <a:t>) </a:t>
+            </a:r>
+            <a:r>
+              <a:rPr lang="en-US" dirty="0" smtClean="0">
+                <a:cs typeface="Rockwell"/>
+              </a:rPr>
+              <a:t>or </a:t>
+            </a:r>
+            <a:r>
+              <a:rPr lang="en-US" i="1" dirty="0" smtClean="0">
+                <a:solidFill>
+                  <a:srgbClr val="CCAF0A"/>
+                </a:solidFill>
+                <a:cs typeface="Rockwell"/>
+              </a:rPr>
+              <a:t>(</a:t>
+            </a:r>
+            <a:r>
+              <a:rPr lang="en-US" i="1" dirty="0" err="1" smtClean="0">
+                <a:solidFill>
+                  <a:srgbClr val="CCAF0A"/>
+                </a:solidFill>
+                <a:cs typeface="Rockwell"/>
+              </a:rPr>
+              <a:t>g</a:t>
+            </a:r>
+            <a:r>
+              <a:rPr lang="en-US" i="1" dirty="0" smtClean="0">
+                <a:solidFill>
+                  <a:srgbClr val="CCAF0A"/>
+                </a:solidFill>
+                <a:cs typeface="Rockwell"/>
+              </a:rPr>
+              <a:t> </a:t>
+            </a:r>
+            <a:r>
+              <a:rPr lang="en-US" i="1" dirty="0" err="1" smtClean="0">
+                <a:solidFill>
+                  <a:srgbClr val="CCAF0A"/>
+                </a:solidFill>
+                <a:cs typeface="Rockwell"/>
+              </a:rPr>
+              <a:t>o</a:t>
+            </a:r>
+            <a:r>
+              <a:rPr lang="en-US" i="1" dirty="0" smtClean="0">
+                <a:solidFill>
+                  <a:srgbClr val="CCAF0A"/>
+                </a:solidFill>
+                <a:cs typeface="Rockwell"/>
+              </a:rPr>
+              <a:t> </a:t>
+            </a:r>
+            <a:r>
+              <a:rPr lang="en-US" i="1" dirty="0" err="1" smtClean="0">
+                <a:solidFill>
+                  <a:srgbClr val="CCAF0A"/>
+                </a:solidFill>
+                <a:cs typeface="Rockwell"/>
+              </a:rPr>
+              <a:t>f</a:t>
+            </a:r>
+            <a:r>
+              <a:rPr lang="en-US" i="1" dirty="0" smtClean="0">
+                <a:solidFill>
+                  <a:srgbClr val="CCAF0A"/>
+                </a:solidFill>
+                <a:cs typeface="Rockwell"/>
+              </a:rPr>
+              <a:t>) = </a:t>
+            </a:r>
+            <a:r>
+              <a:rPr lang="en-US" i="1" dirty="0" err="1" smtClean="0">
+                <a:solidFill>
+                  <a:srgbClr val="CCAF0A"/>
+                </a:solidFill>
+                <a:cs typeface="Rockwell"/>
+              </a:rPr>
+              <a:t>g(f(x</a:t>
+            </a:r>
+            <a:r>
+              <a:rPr lang="en-US" i="1" dirty="0" smtClean="0">
+                <a:solidFill>
+                  <a:srgbClr val="CCAF0A"/>
+                </a:solidFill>
+                <a:cs typeface="Rockwell"/>
+              </a:rPr>
+              <a:t>)</a:t>
+            </a:r>
+            <a:r>
+              <a:rPr lang="en-US" i="1" dirty="0" smtClean="0">
+                <a:solidFill>
+                  <a:srgbClr val="CCAF0A"/>
+                </a:solidFill>
+                <a:cs typeface="Rockwell"/>
+              </a:rPr>
+              <a:t>)</a:t>
+            </a:r>
+            <a:endParaRPr lang="en-US" i="1" dirty="0" smtClean="0">
+              <a:solidFill>
+                <a:srgbClr val="CCAF0A"/>
+              </a:solidFill>
+              <a:latin typeface="+mj-lt"/>
+              <a:cs typeface="Rockwell"/>
+            </a:endParaRPr>
           </a:p>
           <a:p>
             <a:pPr>
@@ -4898,53 +5421,81 @@
               <a:buChar char="§"/>
             </a:pPr>
             <a:r>
-              <a:rPr lang="en-US" dirty="0" smtClean="0"/>
-              <a:t>Higher-order </a:t>
-            </a:r>
-            <a:r>
-              <a:rPr lang="en-US" dirty="0" err="1" smtClean="0"/>
-              <a:t>rockstars</a:t>
-            </a:r>
-            <a:r>
-              <a:rPr lang="en-US" dirty="0" smtClean="0"/>
-              <a:t>:</a:t>
-            </a:r>
-            <a:br>
-              <a:rPr lang="en-US" dirty="0" smtClean="0"/>
-            </a:br>
-            <a:r>
-              <a:rPr lang="en-US" dirty="0" smtClean="0"/>
-              <a:t>	</a:t>
-            </a:r>
-            <a:r>
-              <a:rPr lang="en-US" i="1" dirty="0" smtClean="0">
-                <a:solidFill>
-                  <a:schemeClr val="accent2"/>
-                </a:solidFill>
-              </a:rPr>
-              <a:t>each, map, filter, </a:t>
-            </a:r>
-            <a:r>
-              <a:rPr lang="en-US" i="1" dirty="0" err="1" smtClean="0">
-                <a:solidFill>
-                  <a:schemeClr val="accent2"/>
-                </a:solidFill>
-              </a:rPr>
-              <a:t>foldr</a:t>
-            </a:r>
-            <a:r>
-              <a:rPr lang="en-US" i="1" dirty="0" smtClean="0">
-                <a:solidFill>
-                  <a:schemeClr val="accent2"/>
-                </a:solidFill>
-              </a:rPr>
-              <a:t>  </a:t>
-            </a:r>
-            <a:r>
-              <a:rPr lang="en-US" dirty="0" smtClean="0"/>
-              <a:t>many more!</a:t>
-            </a:r>
-            <a:endParaRPr lang="en-US" dirty="0"/>
+              <a:rPr lang="en-US" dirty="0" smtClean="0">
+                <a:latin typeface="+mj-lt"/>
+                <a:cs typeface="Rockwell"/>
+              </a:rPr>
+              <a:t>Combine the </a:t>
+            </a:r>
+            <a:r>
+              <a:rPr lang="en-US" dirty="0" smtClean="0">
+                <a:latin typeface="+mj-lt"/>
+                <a:cs typeface="Rockwell"/>
+              </a:rPr>
+              <a:t>functions </a:t>
+            </a:r>
+            <a:r>
+              <a:rPr lang="en-US" dirty="0" err="1" smtClean="0">
+                <a:solidFill>
+                  <a:srgbClr val="FFFFFF"/>
+                </a:solidFill>
+                <a:latin typeface="+mj-lt"/>
+                <a:cs typeface="Rockwell"/>
+              </a:rPr>
+              <a:t>g</a:t>
+            </a:r>
+            <a:r>
+              <a:rPr lang="en-US" dirty="0" smtClean="0">
+                <a:solidFill>
+                  <a:srgbClr val="FFFFFF"/>
+                </a:solidFill>
+                <a:latin typeface="+mj-lt"/>
+                <a:cs typeface="Rockwell"/>
+              </a:rPr>
+              <a:t> and </a:t>
+            </a:r>
+            <a:r>
+              <a:rPr lang="en-US" dirty="0" err="1" smtClean="0">
+                <a:latin typeface="+mj-lt"/>
+                <a:cs typeface="Rockwell"/>
+              </a:rPr>
+              <a:t>f</a:t>
+            </a:r>
+            <a:r>
+              <a:rPr lang="en-US" dirty="0" smtClean="0">
+                <a:latin typeface="+mj-lt"/>
+                <a:cs typeface="Rockwell"/>
+              </a:rPr>
+              <a:t> into a new function that uses the result of </a:t>
+            </a:r>
+            <a:r>
+              <a:rPr lang="en-US" dirty="0" err="1" smtClean="0">
+                <a:latin typeface="+mj-lt"/>
+                <a:cs typeface="Rockwell"/>
+              </a:rPr>
+              <a:t>f(x</a:t>
+            </a:r>
+            <a:r>
+              <a:rPr lang="en-US" dirty="0" smtClean="0">
+                <a:latin typeface="+mj-lt"/>
+                <a:cs typeface="Rockwell"/>
+              </a:rPr>
+              <a:t>) as the input to </a:t>
+            </a:r>
+            <a:r>
+              <a:rPr lang="en-US" dirty="0" err="1" smtClean="0">
+                <a:latin typeface="+mj-lt"/>
+                <a:cs typeface="Rockwell"/>
+              </a:rPr>
+              <a:t>g</a:t>
+            </a:r>
+            <a:r>
+              <a:rPr lang="en-US" dirty="0" smtClean="0">
+                <a:latin typeface="+mj-lt"/>
+                <a:cs typeface="Rockwell"/>
+              </a:rPr>
+              <a:t>.</a:t>
+            </a:r>
           </a:p>
         </p:txBody>
       </p:sp>
@@ -4990,70 +5541,150 @@
             <p:ph type="title"/>
           </p:nvPr>
         </p:nvSpPr>
+        <p:spPr/>
+        <p:txBody>
+          <a:bodyPr/>
+          <a:lstStyle/>
+          <a:p>
+            <a:r>
+              <a:rPr lang="en-US" dirty="0" smtClean="0"/>
+              <a:t>In JavaScript:</a:t>
+            </a:r>
+            <a:endParaRPr lang="en-US" dirty="0"/>
+          </a:p>
+        </p:txBody>
+      </p:sp>
+      <p:sp>
+        <p:nvSpPr>
+          <p:cNvPr id="5" name="TextBox 4"/>
+          <p:cNvSpPr txBox="1"/>
+          <p:nvPr/>
+        </p:nvSpPr>
         <p:spPr>
           <a:xfrm>
-            <a:off x="457200" y="274636"/>
-            <a:ext cx="7467600" cy="5107745"/>
+            <a:off x="457200" y="1619905"/>
+            <a:ext cx="8178800" cy="2785378"/>
           </a:xfrm>
+          <a:prstGeom prst="rect">
+            <a:avLst/>
+          </a:prstGeom>
+          <a:noFill/>
         </p:spPr>
         <p:txBody>
-          <a:bodyPr>
-            <a:normAutofit fontScale="90000"/>
+          <a:bodyPr wrap="square" rtlCol="0">
+            <a:spAutoFit/>
           </a:bodyPr>
           <a:lstStyle/>
           <a:p>
             <a:r>
-              <a:rPr lang="en-US" dirty="0" smtClean="0"/>
-              <a:t>Because we know how to pass functions around, we know how to implement these …</a:t>
-            </a:r>
-            <a:br>
-              <a:rPr lang="en-US" dirty="0" smtClean="0"/>
-            </a:br>
-            <a:r>
-              <a:rPr lang="en-US" dirty="0" smtClean="0"/>
-              <a:t/>
-            </a:r>
-            <a:br>
-              <a:rPr lang="en-US" dirty="0" smtClean="0"/>
-            </a:br>
-            <a:r>
-              <a:rPr lang="en-US" dirty="0" smtClean="0"/>
-              <a:t>… but we’d probably duplicate</a:t>
-            </a:r>
-            <a:br>
-              <a:rPr lang="en-US" dirty="0" smtClean="0"/>
-            </a:br>
-            <a:r>
-              <a:rPr lang="en-US" dirty="0" smtClean="0"/>
-              <a:t>    code.</a:t>
-            </a:r>
-            <a:br>
-              <a:rPr lang="en-US" dirty="0" smtClean="0"/>
-            </a:br>
-            <a:r>
-              <a:rPr lang="en-US" dirty="0" smtClean="0"/>
-              <a:t/>
-            </a:r>
-            <a:br>
-              <a:rPr lang="en-US" dirty="0" smtClean="0"/>
-            </a:br>
-            <a:r>
-              <a:rPr lang="en-US" dirty="0" smtClean="0"/>
-              <a:t>Let’s talk about </a:t>
-            </a:r>
-            <a:r>
-              <a:rPr lang="en-US" dirty="0" smtClean="0">
-                <a:solidFill>
-                  <a:srgbClr val="6EA0B0"/>
-                </a:solidFill>
-              </a:rPr>
-              <a:t>folding</a:t>
-            </a:r>
-            <a:r>
-              <a:rPr lang="en-US" dirty="0" smtClean="0"/>
-              <a:t>.</a:t>
-            </a:r>
-            <a:endParaRPr lang="en-US" dirty="0"/>
+              <a:rPr lang="en-US" sz="2500" dirty="0" smtClean="0"/>
+              <a:t>function </a:t>
+            </a:r>
+            <a:r>
+              <a:rPr lang="en-US" sz="2500" dirty="0" err="1" smtClean="0"/>
+              <a:t>compose(f</a:t>
+            </a:r>
+            <a:r>
+              <a:rPr lang="en-US" sz="2500" dirty="0" smtClean="0"/>
+              <a:t>, </a:t>
+            </a:r>
+            <a:r>
+              <a:rPr lang="en-US" sz="2500" dirty="0" err="1" smtClean="0"/>
+              <a:t>g</a:t>
+            </a:r>
+            <a:r>
+              <a:rPr lang="en-US" sz="2500" dirty="0" smtClean="0"/>
+              <a:t>) {</a:t>
+            </a:r>
+          </a:p>
+          <a:p>
+            <a:r>
+              <a:rPr lang="en-US" sz="2500" dirty="0" smtClean="0">
+                <a:solidFill>
+                  <a:schemeClr val="accent1"/>
+                </a:solidFill>
+              </a:rPr>
+              <a:t>  // a closure, closing over the free</a:t>
+            </a:r>
+          </a:p>
+          <a:p>
+            <a:r>
+              <a:rPr lang="en-US" sz="2500" dirty="0" smtClean="0">
+                <a:solidFill>
+                  <a:schemeClr val="accent1"/>
+                </a:solidFill>
+              </a:rPr>
+              <a:t>  // variables </a:t>
+            </a:r>
+            <a:r>
+              <a:rPr lang="en-US" sz="2500" dirty="0" err="1" smtClean="0">
+                <a:solidFill>
+                  <a:schemeClr val="accent1"/>
+                </a:solidFill>
+              </a:rPr>
+              <a:t>f</a:t>
+            </a:r>
+            <a:r>
+              <a:rPr lang="en-US" sz="2500" dirty="0" smtClean="0">
+                <a:solidFill>
+                  <a:schemeClr val="accent1"/>
+                </a:solidFill>
+              </a:rPr>
+              <a:t> and </a:t>
+            </a:r>
+            <a:r>
+              <a:rPr lang="en-US" sz="2500" dirty="0" err="1" smtClean="0">
+                <a:solidFill>
+                  <a:schemeClr val="accent1"/>
+                </a:solidFill>
+              </a:rPr>
+              <a:t>g</a:t>
+            </a:r>
+            <a:endParaRPr lang="en-US" sz="2500" dirty="0" smtClean="0">
+              <a:solidFill>
+                <a:schemeClr val="accent1"/>
+              </a:solidFill>
+            </a:endParaRPr>
+          </a:p>
+          <a:p>
+            <a:r>
+              <a:rPr lang="en-US" sz="2500" dirty="0" smtClean="0"/>
+              <a:t>  return </a:t>
+            </a:r>
+            <a:r>
+              <a:rPr lang="en-US" sz="2500" dirty="0" err="1" smtClean="0"/>
+              <a:t>function(x</a:t>
+            </a:r>
+            <a:r>
+              <a:rPr lang="en-US" sz="2500" dirty="0" smtClean="0"/>
+              <a:t>) {</a:t>
+            </a:r>
+          </a:p>
+          <a:p>
+            <a:r>
+              <a:rPr lang="en-US" sz="2500" dirty="0" smtClean="0"/>
+              <a:t>    return </a:t>
+            </a:r>
+            <a:r>
+              <a:rPr lang="en-US" sz="2500" dirty="0" err="1" smtClean="0"/>
+              <a:t>g(f(x</a:t>
+            </a:r>
+            <a:r>
+              <a:rPr lang="en-US" sz="2500" dirty="0" smtClean="0"/>
+              <a:t>));</a:t>
+            </a:r>
+          </a:p>
+          <a:p>
+            <a:r>
+              <a:rPr lang="en-US" sz="2500" dirty="0" smtClean="0"/>
+              <a:t>  }</a:t>
+            </a:r>
+          </a:p>
+          <a:p>
+            <a:r>
+              <a:rPr lang="en-US" sz="2500" dirty="0" smtClean="0"/>
+              <a:t>}</a:t>
+            </a:r>
           </a:p>
         </p:txBody>
       </p:sp>
@@ -5106,7 +5737,15 @@
           <a:p>
             <a:r>
               <a:rPr lang="en-US" dirty="0" smtClean="0"/>
-              <a:t>In JavaScript:</a:t>
+              <a:t>In </a:t>
+            </a:r>
+            <a:r>
+              <a:rPr lang="en-US" dirty="0" err="1" smtClean="0"/>
+              <a:t>Scala</a:t>
+            </a:r>
+            <a:r>
+              <a:rPr lang="en-US" dirty="0" smtClean="0"/>
+              <a:t>:</a:t>
             </a:r>
             <a:endParaRPr lang="en-US" dirty="0"/>
           </a:p>
@@ -5114,14 +5753,14 @@
       </p:sp>
       <p:sp>
         <p:nvSpPr>
-          <p:cNvPr id="4" name="TextBox 3"/>
+          <p:cNvPr id="6" name="TextBox 5"/>
           <p:cNvSpPr txBox="1"/>
           <p:nvPr/>
         </p:nvSpPr>
         <p:spPr>
           <a:xfrm>
-            <a:off x="457200" y="1862667"/>
-            <a:ext cx="6325689" cy="2785378"/>
+            <a:off x="457200" y="1572381"/>
+            <a:ext cx="6448431" cy="861774"/>
           </a:xfrm>
           <a:prstGeom prst="rect">
             <a:avLst/>
@@ -5136,15 +5775,23 @@
           <a:p>
             <a:r>
               <a:rPr lang="en-US" sz="2500" dirty="0" smtClean="0"/>
-              <a:t>function </a:t>
+              <a:t>def </a:t>
             </a:r>
             <a:r>
               <a:rPr lang="en-US" sz="2500" dirty="0" err="1" smtClean="0"/>
-              <a:t>foldr(list</a:t>
-            </a:r>
-            <a:r>
-              <a:rPr lang="en-US" sz="2500" dirty="0" smtClean="0"/>
-              <a:t>, initial, </a:t>
+              <a:t>compose[A</a:t>
+            </a:r>
+            <a:r>
+              <a:rPr lang="en-US" sz="2500" dirty="0" smtClean="0"/>
+              <a:t>, B, </a:t>
+            </a:r>
+            <a:r>
+              <a:rPr lang="en-US" sz="2500" dirty="0" err="1" smtClean="0"/>
+              <a:t>C](g</a:t>
+            </a:r>
+            <a:r>
+              <a:rPr lang="en-US" sz="2500" dirty="0" smtClean="0"/>
+              <a:t>: B =&gt; C, </a:t>
             </a:r>
             <a:r>
               <a:rPr lang="en-US" sz="2500" dirty="0" err="1" smtClean="0"/>
@@ -5152,67 +5799,37 @@
             </a:r>
             <a:r>
               <a:rPr lang="en-US" sz="2500" dirty="0" smtClean="0"/>
-              <a:t>) {</a:t>
-            </a:r>
-          </a:p>
-          <a:p>
-            <a:r>
-              <a:rPr lang="en-US" sz="2500" dirty="0" smtClean="0"/>
-              <a:t>  </a:t>
+              <a:t>: A =&gt; B) =</a:t>
+            </a:r>
+          </a:p>
+          <a:p>
+            <a:r>
+              <a:rPr lang="en-US" sz="2500" dirty="0" smtClean="0"/>
+              <a:t>  (</a:t>
             </a:r>
             <a:r>
               <a:rPr lang="en-US" sz="2500" dirty="0" err="1" smtClean="0"/>
-              <a:t>if(list.length</a:t>
-            </a:r>
-            <a:r>
-              <a:rPr lang="en-US" sz="2500" dirty="0" smtClean="0"/>
-              <a:t> == 0)</a:t>
-            </a:r>
-          </a:p>
-          <a:p>
-            <a:r>
-              <a:rPr lang="en-US" sz="2500" dirty="0" smtClean="0"/>
-              <a:t>    return initial;</a:t>
-            </a:r>
-          </a:p>
-          <a:p>
-            <a:r>
-              <a:rPr lang="en-US" sz="2500" dirty="0" smtClean="0"/>
-              <a:t>  else {</a:t>
-            </a:r>
-          </a:p>
-          <a:p>
-            <a:r>
-              <a:rPr lang="en-US" sz="2500" dirty="0" smtClean="0"/>
-              <a:t>    return foldr(list.slice(1), </a:t>
+              <a:t>x</a:t>
+            </a:r>
+            <a:r>
+              <a:rPr lang="en-US" sz="2500" dirty="0" smtClean="0"/>
+              <a:t>: A) =&gt; </a:t>
             </a:r>
             <a:r>
               <a:rPr lang="en-US" sz="2500" dirty="0" err="1" smtClean="0"/>
-              <a:t>f(initial</a:t>
-            </a:r>
-            <a:r>
-              <a:rPr lang="en-US" sz="2500" dirty="0" smtClean="0"/>
-              <a:t>, list[0]), </a:t>
-            </a:r>
-            <a:r>
-              <a:rPr lang="en-US" sz="2500" dirty="0" err="1" smtClean="0"/>
-              <a:t>f</a:t>
-            </a:r>
-            <a:r>
-              <a:rPr lang="en-US" sz="2500" dirty="0" smtClean="0"/>
-              <a:t>);</a:t>
-            </a:r>
-          </a:p>
-          <a:p>
-            <a:r>
-              <a:rPr lang="en-US" sz="2500" dirty="0" smtClean="0"/>
-              <a:t>  }</a:t>
-            </a:r>
-          </a:p>
-          <a:p>
-            <a:r>
-              <a:rPr lang="en-US" sz="2500" dirty="0" smtClean="0"/>
-              <a:t>}</a:t>
+              <a:t>g(f(x</a:t>
+            </a:r>
+            <a:r>
+              <a:rPr lang="en-US" sz="2500" dirty="0" smtClean="0"/>
+              <a:t>)) </a:t>
+            </a:r>
+            <a:r>
+              <a:rPr lang="en-US" sz="2500" dirty="0" smtClean="0">
+                <a:solidFill>
+                  <a:srgbClr val="6EA0B0"/>
+                </a:solidFill>
+              </a:rPr>
+              <a:t>// the closure</a:t>
             </a:r>
           </a:p>
         </p:txBody>
@@ -5266,130 +5883,95 @@
           <a:p>
             <a:r>
               <a:rPr lang="en-US" dirty="0" smtClean="0"/>
-              <a:t>In </a:t>
+              <a:t>Higher-Order Functions</a:t>
+            </a:r>
+            <a:endParaRPr lang="en-US" dirty="0"/>
+          </a:p>
+        </p:txBody>
+      </p:sp>
+      <p:sp>
+        <p:nvSpPr>
+          <p:cNvPr id="3" name="Content Placeholder 2"/>
+          <p:cNvSpPr>
+            <a:spLocks noGrp="1"/>
+          </p:cNvSpPr>
+          <p:nvPr>
+            <p:ph idx="1"/>
+          </p:nvPr>
+        </p:nvSpPr>
+        <p:spPr/>
+        <p:txBody>
+          <a:bodyPr/>
+          <a:lstStyle/>
+          <a:p>
+            <a:pPr>
+              <a:buFont typeface="Wingdings" charset="2"/>
+              <a:buChar char="§"/>
+            </a:pPr>
+            <a:r>
+              <a:rPr lang="en-US" dirty="0" smtClean="0"/>
+              <a:t>A function that takes another function as an argument and/or returns a function as its result.</a:t>
+            </a:r>
+          </a:p>
+          <a:p>
+            <a:pPr>
+              <a:buFont typeface="Wingdings" charset="2"/>
+              <a:buChar char="§"/>
+            </a:pPr>
+            <a:r>
+              <a:rPr lang="en-US" dirty="0" smtClean="0"/>
+              <a:t>Ruby, via Rails, brought list-bound implementations of higher-order functions mainstream.</a:t>
+            </a:r>
+          </a:p>
+          <a:p>
+            <a:pPr>
+              <a:buFont typeface="Wingdings" charset="2"/>
+              <a:buChar char="§"/>
+            </a:pPr>
+            <a:r>
+              <a:rPr lang="en-US" dirty="0" smtClean="0"/>
+              <a:t>Higher-order </a:t>
             </a:r>
             <a:r>
               <a:rPr lang="en-US" dirty="0" err="1" smtClean="0"/>
-              <a:t>Scala</a:t>
+              <a:t>rockstars</a:t>
             </a:r>
             <a:r>
               <a:rPr lang="en-US" dirty="0" smtClean="0"/>
               <a:t>:</a:t>
             </a:r>
+            <a:br>
+              <a:rPr lang="en-US" dirty="0" smtClean="0"/>
+            </a:br>
+            <a:r>
+              <a:rPr lang="en-US" dirty="0" smtClean="0"/>
+              <a:t>	</a:t>
+            </a:r>
+            <a:r>
+              <a:rPr lang="en-US" i="1" dirty="0" smtClean="0">
+                <a:solidFill>
+                  <a:schemeClr val="accent2"/>
+                </a:solidFill>
+              </a:rPr>
+              <a:t>each, map, filter,</a:t>
+            </a:r>
+            <a:r>
+              <a:rPr lang="en-US" i="1" dirty="0" smtClean="0">
+                <a:solidFill>
+                  <a:schemeClr val="accent2"/>
+                </a:solidFill>
+              </a:rPr>
+              <a:t> inject  </a:t>
+            </a:r>
+            <a:r>
+              <a:rPr lang="en-US" dirty="0" smtClean="0"/>
+              <a:t>many </a:t>
+            </a:r>
+            <a:r>
+              <a:rPr lang="en-US" dirty="0" smtClean="0"/>
+              <a:t>more!</a:t>
+            </a:r>
             <a:endParaRPr lang="en-US" dirty="0"/>
-          </a:p>
-        </p:txBody>
-      </p:sp>
-      <p:sp>
-        <p:nvSpPr>
-          <p:cNvPr id="4" name="TextBox 3"/>
-          <p:cNvSpPr txBox="1"/>
-          <p:nvPr/>
-        </p:nvSpPr>
-        <p:spPr>
-          <a:xfrm>
-            <a:off x="457200" y="1862667"/>
-            <a:ext cx="7552218" cy="2015936"/>
-          </a:xfrm>
-          <a:prstGeom prst="rect">
-            <a:avLst/>
-          </a:prstGeom>
-          <a:noFill/>
-        </p:spPr>
-        <p:txBody>
-          <a:bodyPr wrap="none" rtlCol="0">
-            <a:spAutoFit/>
-          </a:bodyPr>
-          <a:lstStyle/>
-          <a:p>
-            <a:r>
-              <a:rPr lang="en-US" sz="2500" dirty="0" smtClean="0"/>
-              <a:t>def </a:t>
-            </a:r>
-            <a:r>
-              <a:rPr lang="en-US" sz="2500" dirty="0" err="1" smtClean="0"/>
-              <a:t>foldr[A</a:t>
-            </a:r>
-            <a:r>
-              <a:rPr lang="en-US" sz="2500" dirty="0" smtClean="0"/>
-              <a:t>, </a:t>
-            </a:r>
-            <a:r>
-              <a:rPr lang="en-US" sz="2500" dirty="0" err="1" smtClean="0"/>
-              <a:t>B](list</a:t>
-            </a:r>
-            <a:r>
-              <a:rPr lang="en-US" sz="2500" dirty="0" smtClean="0"/>
-              <a:t>: </a:t>
-            </a:r>
-            <a:r>
-              <a:rPr lang="en-US" sz="2500" dirty="0" err="1" smtClean="0"/>
-              <a:t>List[A</a:t>
-            </a:r>
-            <a:r>
-              <a:rPr lang="en-US" sz="2500" dirty="0" smtClean="0"/>
-              <a:t>], acc: B, </a:t>
-            </a:r>
-            <a:r>
-              <a:rPr lang="en-US" sz="2500" dirty="0" err="1" smtClean="0"/>
-              <a:t>f</a:t>
-            </a:r>
-            <a:r>
-              <a:rPr lang="en-US" sz="2500" dirty="0" smtClean="0"/>
-              <a:t>: (B, A) =&gt; B): B =</a:t>
-            </a:r>
-          </a:p>
-          <a:p>
-            <a:r>
-              <a:rPr lang="en-US" sz="2500" dirty="0" smtClean="0"/>
-              <a:t>  </a:t>
-            </a:r>
-            <a:r>
-              <a:rPr lang="en-US" sz="2500" dirty="0" smtClean="0"/>
-              <a:t>list match {</a:t>
-            </a:r>
-          </a:p>
-          <a:p>
-            <a:r>
-              <a:rPr lang="en-US" sz="2500" dirty="0" smtClean="0"/>
-              <a:t>    case Nil =&gt; acc</a:t>
-            </a:r>
-          </a:p>
-          <a:p>
-            <a:r>
-              <a:rPr lang="en-US" sz="2500" dirty="0" smtClean="0"/>
-              <a:t>    case head :: tail =&gt; </a:t>
-            </a:r>
-            <a:r>
-              <a:rPr lang="en-US" sz="2500" dirty="0" err="1" smtClean="0"/>
-              <a:t>foldr(tail</a:t>
-            </a:r>
-            <a:r>
-              <a:rPr lang="en-US" sz="2500" dirty="0" smtClean="0"/>
-              <a:t>, </a:t>
-            </a:r>
-            <a:r>
-              <a:rPr lang="en-US" sz="2500" dirty="0" err="1" smtClean="0"/>
-              <a:t>f(acc</a:t>
-            </a:r>
-            <a:r>
-              <a:rPr lang="en-US" sz="2500" dirty="0" smtClean="0"/>
-              <a:t>, head), </a:t>
-            </a:r>
-            <a:r>
-              <a:rPr lang="en-US" sz="2500" dirty="0" err="1" smtClean="0"/>
-              <a:t>f</a:t>
-            </a:r>
-            <a:r>
-              <a:rPr lang="en-US" sz="2500" dirty="0" smtClean="0"/>
-              <a:t>)</a:t>
-            </a:r>
-          </a:p>
-          <a:p>
-            <a:r>
-              <a:rPr lang="en-US" sz="2500" dirty="0" smtClean="0"/>
-              <a:t>  }</a:t>
-            </a:r>
           </a:p>
         </p:txBody>
       </p:sp>
@@ -5484,11 +6066,7 @@
             </a:pPr>
             <a:r>
               <a:rPr lang="en-US" sz="3000" dirty="0" smtClean="0"/>
-              <a:t>Formal system: a basic set of principles and a set of rules dictating how to operate within those principles</a:t>
-            </a:r>
-            <a:r>
-              <a:rPr lang="en-US" sz="3000" dirty="0" smtClean="0"/>
-              <a:t>.</a:t>
+              <a:t>Formal system: a basic set of principles and a set of rules dictating how to operate within those principles.</a:t>
             </a:r>
           </a:p>
           <a:p>
@@ -5499,11 +6077,7 @@
             </a:pPr>
             <a:r>
               <a:rPr lang="en-US" sz="3000" dirty="0" smtClean="0"/>
-              <a:t>Rules can be logically combined to form more complex rules</a:t>
-            </a:r>
-            <a:r>
-              <a:rPr lang="en-US" sz="3000" dirty="0" smtClean="0"/>
-              <a:t>.</a:t>
+              <a:t>Rules can be logically combined to form more complex rules.</a:t>
             </a:r>
           </a:p>
           <a:p>
@@ -5524,7 +6098,1428 @@
               <a:rPr lang="en-US" sz="3000" dirty="0" smtClean="0"/>
               <a:t>.</a:t>
             </a:r>
-            <a:endParaRPr lang="en-US" sz="3000" dirty="0" smtClean="0"/>
+          </a:p>
+        </p:txBody>
+      </p:sp>
+    </p:spTree>
+  </p:cSld>
+  <p:clrMapOvr>
+    <a:masterClrMapping/>
+  </p:clrMapOvr>
+  <p:timing>
+    <p:tnLst>
+      <p:par>
+        <p:cTn id="1" dur="indefinite" restart="never" nodeType="tmRoot"/>
+      </p:par>
+    </p:tnLst>
+  </p:timing>
+</p:sld>
+</file>
+
+<file path=ppt/slides/slide20.xml><?xml version="1.0" encoding="utf-8"?>
+<p:sld xmlns:a="http://schemas.openxmlformats.org/drawingml/2006/main" xmlns:r="http://schemas.openxmlformats.org/officeDocument/2006/relationships" xmlns:mc="http://schemas.openxmlformats.org/markup-compatibility/2006" xmlns:mv="urn:schemas-microsoft-com:mac:vml" xmlns:p="http://schemas.openxmlformats.org/presentationml/2006/main" mc:Ignorable="mv" mc:PreserveAttributes="mv:*">
+  <p:cSld>
+    <p:spTree>
+      <p:nvGrpSpPr>
+        <p:cNvPr id="1" name=""/>
+        <p:cNvGrpSpPr/>
+        <p:nvPr/>
+      </p:nvGrpSpPr>
+      <p:grpSpPr>
+        <a:xfrm>
+          <a:off x="0" y="0"/>
+          <a:ext cx="0" cy="0"/>
+          <a:chOff x="0" y="0"/>
+          <a:chExt cx="0" cy="0"/>
+        </a:xfrm>
+      </p:grpSpPr>
+      <p:sp>
+        <p:nvSpPr>
+          <p:cNvPr id="2" name="Title 1"/>
+          <p:cNvSpPr>
+            <a:spLocks noGrp="1"/>
+          </p:cNvSpPr>
+          <p:nvPr>
+            <p:ph type="title"/>
+          </p:nvPr>
+        </p:nvSpPr>
+        <p:spPr>
+          <a:xfrm>
+            <a:off x="457200" y="274636"/>
+            <a:ext cx="7467600" cy="5107745"/>
+          </a:xfrm>
+        </p:spPr>
+        <p:txBody>
+          <a:bodyPr>
+            <a:normAutofit fontScale="90000"/>
+          </a:bodyPr>
+          <a:lstStyle/>
+          <a:p>
+            <a:r>
+              <a:rPr lang="en-US" dirty="0" smtClean="0"/>
+              <a:t>Because we know how to pass functions around, we know how to implement these …</a:t>
+            </a:r>
+            <a:br>
+              <a:rPr lang="en-US" dirty="0" smtClean="0"/>
+            </a:br>
+            <a:r>
+              <a:rPr lang="en-US" dirty="0" smtClean="0"/>
+              <a:t/>
+            </a:r>
+            <a:br>
+              <a:rPr lang="en-US" dirty="0" smtClean="0"/>
+            </a:br>
+            <a:r>
+              <a:rPr lang="en-US" dirty="0" smtClean="0"/>
+              <a:t>… but </a:t>
+            </a:r>
+            <a:r>
+              <a:rPr lang="en-US" dirty="0" smtClean="0"/>
+              <a:t>we’ll </a:t>
+            </a:r>
+            <a:r>
+              <a:rPr lang="en-US" dirty="0" smtClean="0"/>
+              <a:t>probably duplicate</a:t>
+            </a:r>
+            <a:br>
+              <a:rPr lang="en-US" dirty="0" smtClean="0"/>
+            </a:br>
+            <a:r>
+              <a:rPr lang="en-US" dirty="0" smtClean="0"/>
+              <a:t>    code.</a:t>
+            </a:r>
+            <a:r>
+              <a:rPr lang="en-US" smtClean="0"/>
+              <a:t/>
+            </a:r>
+            <a:br>
+              <a:rPr lang="en-US" smtClean="0"/>
+            </a:br>
+            <a:r>
+              <a:rPr lang="en-US" smtClean="0"/>
+              <a:t/>
+            </a:r>
+            <a:br>
+              <a:rPr lang="en-US" smtClean="0"/>
+            </a:br>
+            <a:endParaRPr lang="en-US" dirty="0"/>
+          </a:p>
+        </p:txBody>
+      </p:sp>
+    </p:spTree>
+  </p:cSld>
+  <p:clrMapOvr>
+    <a:masterClrMapping/>
+  </p:clrMapOvr>
+  <p:timing>
+    <p:tnLst>
+      <p:par>
+        <p:cTn id="1" dur="indefinite" restart="never" nodeType="tmRoot"/>
+      </p:par>
+    </p:tnLst>
+  </p:timing>
+</p:sld>
+</file>
+
+<file path=ppt/slides/slide21.xml><?xml version="1.0" encoding="utf-8"?>
+<p:sld xmlns:a="http://schemas.openxmlformats.org/drawingml/2006/main" xmlns:r="http://schemas.openxmlformats.org/officeDocument/2006/relationships" xmlns:mc="http://schemas.openxmlformats.org/markup-compatibility/2006" xmlns:mv="urn:schemas-microsoft-com:mac:vml" xmlns:p="http://schemas.openxmlformats.org/presentationml/2006/main" mc:Ignorable="mv" mc:PreserveAttributes="mv:*">
+  <p:cSld>
+    <p:spTree>
+      <p:nvGrpSpPr>
+        <p:cNvPr id="1" name=""/>
+        <p:cNvGrpSpPr/>
+        <p:nvPr/>
+      </p:nvGrpSpPr>
+      <p:grpSpPr>
+        <a:xfrm>
+          <a:off x="0" y="0"/>
+          <a:ext cx="0" cy="0"/>
+          <a:chOff x="0" y="0"/>
+          <a:chExt cx="0" cy="0"/>
+        </a:xfrm>
+      </p:grpSpPr>
+      <p:sp>
+        <p:nvSpPr>
+          <p:cNvPr id="2" name="Title 1"/>
+          <p:cNvSpPr>
+            <a:spLocks noGrp="1"/>
+          </p:cNvSpPr>
+          <p:nvPr>
+            <p:ph type="title"/>
+          </p:nvPr>
+        </p:nvSpPr>
+        <p:spPr>
+          <a:xfrm>
+            <a:off x="457200" y="274636"/>
+            <a:ext cx="7467600" cy="5107745"/>
+          </a:xfrm>
+        </p:spPr>
+        <p:txBody>
+          <a:bodyPr>
+            <a:normAutofit fontScale="90000"/>
+          </a:bodyPr>
+          <a:lstStyle/>
+          <a:p>
+            <a:r>
+              <a:rPr lang="en-US" dirty="0" smtClean="0"/>
+              <a:t>Because we know how to pass functions around, we know how to implement these …</a:t>
+            </a:r>
+            <a:br>
+              <a:rPr lang="en-US" dirty="0" smtClean="0"/>
+            </a:br>
+            <a:r>
+              <a:rPr lang="en-US" dirty="0" smtClean="0"/>
+              <a:t/>
+            </a:r>
+            <a:br>
+              <a:rPr lang="en-US" dirty="0" smtClean="0"/>
+            </a:br>
+            <a:r>
+              <a:rPr lang="en-US" dirty="0" smtClean="0"/>
+              <a:t>… </a:t>
+            </a:r>
+            <a:r>
+              <a:rPr lang="en-US" smtClean="0"/>
+              <a:t>but </a:t>
+            </a:r>
+            <a:r>
+              <a:rPr lang="en-US" smtClean="0"/>
+              <a:t>we’ll </a:t>
+            </a:r>
+            <a:r>
+              <a:rPr lang="en-US" dirty="0" smtClean="0"/>
+              <a:t>probably duplicate</a:t>
+            </a:r>
+            <a:br>
+              <a:rPr lang="en-US" dirty="0" smtClean="0"/>
+            </a:br>
+            <a:r>
+              <a:rPr lang="en-US" dirty="0" smtClean="0"/>
+              <a:t>    code.</a:t>
+            </a:r>
+            <a:br>
+              <a:rPr lang="en-US" dirty="0" smtClean="0"/>
+            </a:br>
+            <a:r>
+              <a:rPr lang="en-US" dirty="0" smtClean="0"/>
+              <a:t/>
+            </a:r>
+            <a:br>
+              <a:rPr lang="en-US" dirty="0" smtClean="0"/>
+            </a:br>
+            <a:r>
+              <a:rPr lang="en-US" dirty="0" smtClean="0"/>
+              <a:t>Let’s talk about </a:t>
+            </a:r>
+            <a:r>
+              <a:rPr lang="en-US" dirty="0" smtClean="0">
+                <a:solidFill>
+                  <a:srgbClr val="6EA0B0"/>
+                </a:solidFill>
+              </a:rPr>
+              <a:t>folding</a:t>
+            </a:r>
+            <a:r>
+              <a:rPr lang="en-US" dirty="0" smtClean="0"/>
+              <a:t>.</a:t>
+            </a:r>
+            <a:endParaRPr lang="en-US" dirty="0"/>
+          </a:p>
+        </p:txBody>
+      </p:sp>
+    </p:spTree>
+  </p:cSld>
+  <p:clrMapOvr>
+    <a:masterClrMapping/>
+  </p:clrMapOvr>
+  <p:timing>
+    <p:tnLst>
+      <p:par>
+        <p:cTn id="1" dur="indefinite" restart="never" nodeType="tmRoot"/>
+      </p:par>
+    </p:tnLst>
+  </p:timing>
+</p:sld>
+</file>
+
+<file path=ppt/slides/slide22.xml><?xml version="1.0" encoding="utf-8"?>
+<p:sld xmlns:a="http://schemas.openxmlformats.org/drawingml/2006/main" xmlns:r="http://schemas.openxmlformats.org/officeDocument/2006/relationships" xmlns:mc="http://schemas.openxmlformats.org/markup-compatibility/2006" xmlns:mv="urn:schemas-microsoft-com:mac:vml" xmlns:p="http://schemas.openxmlformats.org/presentationml/2006/main" mc:Ignorable="mv" mc:PreserveAttributes="mv:*">
+  <p:cSld>
+    <p:spTree>
+      <p:nvGrpSpPr>
+        <p:cNvPr id="1" name=""/>
+        <p:cNvGrpSpPr/>
+        <p:nvPr/>
+      </p:nvGrpSpPr>
+      <p:grpSpPr>
+        <a:xfrm>
+          <a:off x="0" y="0"/>
+          <a:ext cx="0" cy="0"/>
+          <a:chOff x="0" y="0"/>
+          <a:chExt cx="0" cy="0"/>
+        </a:xfrm>
+      </p:grpSpPr>
+      <p:sp>
+        <p:nvSpPr>
+          <p:cNvPr id="2" name="Title 1"/>
+          <p:cNvSpPr>
+            <a:spLocks noGrp="1"/>
+          </p:cNvSpPr>
+          <p:nvPr>
+            <p:ph type="title"/>
+          </p:nvPr>
+        </p:nvSpPr>
+        <p:spPr/>
+        <p:txBody>
+          <a:bodyPr/>
+          <a:lstStyle/>
+          <a:p>
+            <a:r>
+              <a:rPr lang="en-US" dirty="0" smtClean="0"/>
+              <a:t>In JavaScript:</a:t>
+            </a:r>
+            <a:endParaRPr lang="en-US" dirty="0"/>
+          </a:p>
+        </p:txBody>
+      </p:sp>
+      <p:sp>
+        <p:nvSpPr>
+          <p:cNvPr id="4" name="TextBox 3"/>
+          <p:cNvSpPr txBox="1"/>
+          <p:nvPr/>
+        </p:nvSpPr>
+        <p:spPr>
+          <a:xfrm>
+            <a:off x="457200" y="1862667"/>
+            <a:ext cx="6004932" cy="2785378"/>
+          </a:xfrm>
+          <a:prstGeom prst="rect">
+            <a:avLst/>
+          </a:prstGeom>
+          <a:noFill/>
+        </p:spPr>
+        <p:txBody>
+          <a:bodyPr wrap="none" rtlCol="0">
+            <a:spAutoFit/>
+          </a:bodyPr>
+          <a:lstStyle/>
+          <a:p>
+            <a:r>
+              <a:rPr lang="en-US" sz="2500" dirty="0" smtClean="0"/>
+              <a:t>function </a:t>
+            </a:r>
+            <a:r>
+              <a:rPr lang="en-US" sz="2500" dirty="0" err="1" smtClean="0"/>
+              <a:t>foldr(list</a:t>
+            </a:r>
+            <a:r>
+              <a:rPr lang="en-US" sz="2500" dirty="0" smtClean="0"/>
+              <a:t>,</a:t>
+            </a:r>
+            <a:r>
+              <a:rPr lang="en-US" sz="2500" dirty="0" smtClean="0"/>
+              <a:t> init, </a:t>
+            </a:r>
+            <a:r>
+              <a:rPr lang="en-US" sz="2500" dirty="0" err="1" smtClean="0"/>
+              <a:t>f</a:t>
+            </a:r>
+            <a:r>
+              <a:rPr lang="en-US" sz="2500" dirty="0" smtClean="0"/>
+              <a:t>) {</a:t>
+            </a:r>
+          </a:p>
+          <a:p>
+            <a:r>
+              <a:rPr lang="en-US" sz="2500" dirty="0" smtClean="0"/>
+              <a:t>  </a:t>
+            </a:r>
+            <a:r>
+              <a:rPr lang="en-US" sz="2500" dirty="0" err="1" smtClean="0"/>
+              <a:t>if(list.length</a:t>
+            </a:r>
+            <a:r>
+              <a:rPr lang="en-US" sz="2500" dirty="0" smtClean="0"/>
+              <a:t> == 0)</a:t>
+            </a:r>
+          </a:p>
+          <a:p>
+            <a:r>
+              <a:rPr lang="en-US" sz="2500" dirty="0" smtClean="0"/>
+              <a:t>    return</a:t>
+            </a:r>
+            <a:r>
+              <a:rPr lang="en-US" sz="2500" dirty="0" smtClean="0"/>
+              <a:t> init;</a:t>
+            </a:r>
+            <a:endParaRPr lang="en-US" sz="2500" dirty="0" smtClean="0"/>
+          </a:p>
+          <a:p>
+            <a:r>
+              <a:rPr lang="en-US" sz="2500" dirty="0" smtClean="0"/>
+              <a:t>  else {</a:t>
+            </a:r>
+          </a:p>
+          <a:p>
+            <a:r>
+              <a:rPr lang="en-US" sz="2500" dirty="0" smtClean="0"/>
+              <a:t>    return foldr(list.slice(1), </a:t>
+            </a:r>
+            <a:r>
+              <a:rPr lang="en-US" sz="2500" dirty="0" err="1" smtClean="0"/>
+              <a:t>f</a:t>
+            </a:r>
+            <a:r>
+              <a:rPr lang="en-US" sz="2500" dirty="0" err="1" smtClean="0"/>
+              <a:t>(init</a:t>
+            </a:r>
+            <a:r>
+              <a:rPr lang="en-US" sz="2500" dirty="0" smtClean="0"/>
+              <a:t>, </a:t>
+            </a:r>
+            <a:r>
+              <a:rPr lang="en-US" sz="2500" dirty="0" smtClean="0"/>
+              <a:t>list[0]), </a:t>
+            </a:r>
+            <a:r>
+              <a:rPr lang="en-US" sz="2500" dirty="0" err="1" smtClean="0"/>
+              <a:t>f</a:t>
+            </a:r>
+            <a:r>
+              <a:rPr lang="en-US" sz="2500" dirty="0" smtClean="0"/>
+              <a:t>);</a:t>
+            </a:r>
+          </a:p>
+          <a:p>
+            <a:r>
+              <a:rPr lang="en-US" sz="2500" dirty="0" smtClean="0"/>
+              <a:t>  }</a:t>
+            </a:r>
+          </a:p>
+          <a:p>
+            <a:r>
+              <a:rPr lang="en-US" sz="2500" dirty="0" smtClean="0"/>
+              <a:t>}</a:t>
+            </a:r>
+          </a:p>
+        </p:txBody>
+      </p:sp>
+    </p:spTree>
+  </p:cSld>
+  <p:clrMapOvr>
+    <a:masterClrMapping/>
+  </p:clrMapOvr>
+  <p:timing>
+    <p:tnLst>
+      <p:par>
+        <p:cTn id="1" dur="indefinite" restart="never" nodeType="tmRoot"/>
+      </p:par>
+    </p:tnLst>
+  </p:timing>
+</p:sld>
+</file>
+
+<file path=ppt/slides/slide23.xml><?xml version="1.0" encoding="utf-8"?>
+<p:sld xmlns:a="http://schemas.openxmlformats.org/drawingml/2006/main" xmlns:r="http://schemas.openxmlformats.org/officeDocument/2006/relationships" xmlns:mc="http://schemas.openxmlformats.org/markup-compatibility/2006" xmlns:mv="urn:schemas-microsoft-com:mac:vml" xmlns:p="http://schemas.openxmlformats.org/presentationml/2006/main" mc:Ignorable="mv" mc:PreserveAttributes="mv:*">
+  <p:cSld>
+    <p:spTree>
+      <p:nvGrpSpPr>
+        <p:cNvPr id="1" name=""/>
+        <p:cNvGrpSpPr/>
+        <p:nvPr/>
+      </p:nvGrpSpPr>
+      <p:grpSpPr>
+        <a:xfrm>
+          <a:off x="0" y="0"/>
+          <a:ext cx="0" cy="0"/>
+          <a:chOff x="0" y="0"/>
+          <a:chExt cx="0" cy="0"/>
+        </a:xfrm>
+      </p:grpSpPr>
+      <p:sp>
+        <p:nvSpPr>
+          <p:cNvPr id="2" name="Title 1"/>
+          <p:cNvSpPr>
+            <a:spLocks noGrp="1"/>
+          </p:cNvSpPr>
+          <p:nvPr>
+            <p:ph type="title"/>
+          </p:nvPr>
+        </p:nvSpPr>
+        <p:spPr/>
+        <p:txBody>
+          <a:bodyPr/>
+          <a:lstStyle/>
+          <a:p>
+            <a:r>
+              <a:rPr lang="en-US" dirty="0" smtClean="0"/>
+              <a:t>In </a:t>
+            </a:r>
+            <a:r>
+              <a:rPr lang="en-US" dirty="0" err="1" smtClean="0"/>
+              <a:t>Scala</a:t>
+            </a:r>
+            <a:r>
+              <a:rPr lang="en-US" dirty="0" smtClean="0"/>
+              <a:t>:</a:t>
+            </a:r>
+            <a:endParaRPr lang="en-US" dirty="0"/>
+          </a:p>
+        </p:txBody>
+      </p:sp>
+      <p:sp>
+        <p:nvSpPr>
+          <p:cNvPr id="4" name="TextBox 3"/>
+          <p:cNvSpPr txBox="1"/>
+          <p:nvPr/>
+        </p:nvSpPr>
+        <p:spPr>
+          <a:xfrm>
+            <a:off x="457200" y="1862667"/>
+            <a:ext cx="7463144" cy="2015936"/>
+          </a:xfrm>
+          <a:prstGeom prst="rect">
+            <a:avLst/>
+          </a:prstGeom>
+          <a:noFill/>
+        </p:spPr>
+        <p:txBody>
+          <a:bodyPr wrap="none" rtlCol="0">
+            <a:spAutoFit/>
+          </a:bodyPr>
+          <a:lstStyle/>
+          <a:p>
+            <a:r>
+              <a:rPr lang="en-US" sz="2500" dirty="0" smtClean="0"/>
+              <a:t>def </a:t>
+            </a:r>
+            <a:r>
+              <a:rPr lang="en-US" sz="2500" dirty="0" err="1" smtClean="0"/>
+              <a:t>foldr[A</a:t>
+            </a:r>
+            <a:r>
+              <a:rPr lang="en-US" sz="2500" dirty="0" smtClean="0"/>
+              <a:t>, </a:t>
+            </a:r>
+            <a:r>
+              <a:rPr lang="en-US" sz="2500" dirty="0" err="1" smtClean="0"/>
+              <a:t>B](list</a:t>
+            </a:r>
+            <a:r>
+              <a:rPr lang="en-US" sz="2500" dirty="0" smtClean="0"/>
+              <a:t>: </a:t>
+            </a:r>
+            <a:r>
+              <a:rPr lang="en-US" sz="2500" dirty="0" err="1" smtClean="0"/>
+              <a:t>List[A</a:t>
+            </a:r>
+            <a:r>
+              <a:rPr lang="en-US" sz="2500" dirty="0" smtClean="0"/>
+              <a:t>],</a:t>
+            </a:r>
+            <a:r>
+              <a:rPr lang="en-US" sz="2500" dirty="0" smtClean="0"/>
+              <a:t> init: </a:t>
+            </a:r>
+            <a:r>
+              <a:rPr lang="en-US" sz="2500" dirty="0" smtClean="0"/>
+              <a:t>B, </a:t>
+            </a:r>
+            <a:r>
+              <a:rPr lang="en-US" sz="2500" dirty="0" err="1" smtClean="0"/>
+              <a:t>f</a:t>
+            </a:r>
+            <a:r>
+              <a:rPr lang="en-US" sz="2500" dirty="0" smtClean="0"/>
+              <a:t>: (B, A) =&gt; B): B =</a:t>
+            </a:r>
+          </a:p>
+          <a:p>
+            <a:r>
+              <a:rPr lang="en-US" sz="2500" dirty="0" smtClean="0"/>
+              <a:t>  list match {</a:t>
+            </a:r>
+          </a:p>
+          <a:p>
+            <a:r>
+              <a:rPr lang="en-US" sz="2500" dirty="0" smtClean="0"/>
+              <a:t>    case Nil =&gt;</a:t>
+            </a:r>
+            <a:r>
+              <a:rPr lang="en-US" sz="2500" dirty="0" smtClean="0"/>
+              <a:t> init</a:t>
+            </a:r>
+          </a:p>
+          <a:p>
+            <a:r>
+              <a:rPr lang="en-US" sz="2500" dirty="0" smtClean="0"/>
+              <a:t>    case head :: tail =&gt; </a:t>
+            </a:r>
+            <a:r>
+              <a:rPr lang="en-US" sz="2500" dirty="0" err="1" smtClean="0"/>
+              <a:t>foldr(tail</a:t>
+            </a:r>
+            <a:r>
+              <a:rPr lang="en-US" sz="2500" dirty="0" smtClean="0"/>
+              <a:t>, </a:t>
+            </a:r>
+            <a:r>
+              <a:rPr lang="en-US" sz="2500" dirty="0" err="1" smtClean="0"/>
+              <a:t>f</a:t>
+            </a:r>
+            <a:r>
+              <a:rPr lang="en-US" sz="2500" dirty="0" err="1" smtClean="0"/>
+              <a:t>(init</a:t>
+            </a:r>
+            <a:r>
+              <a:rPr lang="en-US" sz="2500" dirty="0" smtClean="0"/>
+              <a:t>, </a:t>
+            </a:r>
+            <a:r>
+              <a:rPr lang="en-US" sz="2500" dirty="0" smtClean="0"/>
+              <a:t>head), </a:t>
+            </a:r>
+            <a:r>
+              <a:rPr lang="en-US" sz="2500" dirty="0" err="1" smtClean="0"/>
+              <a:t>f</a:t>
+            </a:r>
+            <a:r>
+              <a:rPr lang="en-US" sz="2500" dirty="0" smtClean="0"/>
+              <a:t>)</a:t>
+            </a:r>
+          </a:p>
+          <a:p>
+            <a:r>
+              <a:rPr lang="en-US" sz="2500" dirty="0" smtClean="0"/>
+              <a:t>  }</a:t>
+            </a:r>
+          </a:p>
+        </p:txBody>
+      </p:sp>
+    </p:spTree>
+  </p:cSld>
+  <p:clrMapOvr>
+    <a:masterClrMapping/>
+  </p:clrMapOvr>
+  <p:timing>
+    <p:tnLst>
+      <p:par>
+        <p:cTn id="1" dur="indefinite" restart="never" nodeType="tmRoot"/>
+      </p:par>
+    </p:tnLst>
+  </p:timing>
+</p:sld>
+</file>
+
+<file path=ppt/slides/slide24.xml><?xml version="1.0" encoding="utf-8"?>
+<p:sld xmlns:a="http://schemas.openxmlformats.org/drawingml/2006/main" xmlns:r="http://schemas.openxmlformats.org/officeDocument/2006/relationships" xmlns:mc="http://schemas.openxmlformats.org/markup-compatibility/2006" xmlns:mv="urn:schemas-microsoft-com:mac:vml" xmlns:p="http://schemas.openxmlformats.org/presentationml/2006/main" mc:Ignorable="mv" mc:PreserveAttributes="mv:*">
+  <p:cSld>
+    <p:spTree>
+      <p:nvGrpSpPr>
+        <p:cNvPr id="1" name=""/>
+        <p:cNvGrpSpPr/>
+        <p:nvPr/>
+      </p:nvGrpSpPr>
+      <p:grpSpPr>
+        <a:xfrm>
+          <a:off x="0" y="0"/>
+          <a:ext cx="0" cy="0"/>
+          <a:chOff x="0" y="0"/>
+          <a:chExt cx="0" cy="0"/>
+        </a:xfrm>
+      </p:grpSpPr>
+      <p:sp>
+        <p:nvSpPr>
+          <p:cNvPr id="2" name="Title 1"/>
+          <p:cNvSpPr>
+            <a:spLocks noGrp="1"/>
+          </p:cNvSpPr>
+          <p:nvPr>
+            <p:ph type="title"/>
+          </p:nvPr>
+        </p:nvSpPr>
+        <p:spPr/>
+        <p:txBody>
+          <a:bodyPr>
+            <a:normAutofit fontScale="90000"/>
+          </a:bodyPr>
+          <a:lstStyle/>
+          <a:p>
+            <a:r>
+              <a:rPr lang="en-US" dirty="0" smtClean="0"/>
+              <a:t>Some List Functions That can </a:t>
+            </a:r>
+            <a:r>
+              <a:rPr lang="en-US" dirty="0" smtClean="0"/>
+              <a:t>b</a:t>
+            </a:r>
+            <a:r>
+              <a:rPr lang="en-US" dirty="0" smtClean="0"/>
+              <a:t>e Defined in Terms of Folding</a:t>
+            </a:r>
+            <a:endParaRPr lang="en-US" dirty="0"/>
+          </a:p>
+        </p:txBody>
+      </p:sp>
+      <p:sp>
+        <p:nvSpPr>
+          <p:cNvPr id="3" name="Content Placeholder 2"/>
+          <p:cNvSpPr>
+            <a:spLocks noGrp="1"/>
+          </p:cNvSpPr>
+          <p:nvPr>
+            <p:ph idx="1"/>
+          </p:nvPr>
+        </p:nvSpPr>
+        <p:spPr/>
+        <p:txBody>
+          <a:bodyPr>
+            <a:normAutofit lnSpcReduction="10000"/>
+          </a:bodyPr>
+          <a:lstStyle/>
+          <a:p>
+            <a:pPr>
+              <a:buFont typeface="Wingdings" charset="2"/>
+              <a:buChar char="§"/>
+            </a:pPr>
+            <a:r>
+              <a:rPr lang="en-US" dirty="0" smtClean="0"/>
+              <a:t>s</a:t>
+            </a:r>
+            <a:r>
+              <a:rPr lang="en-US" dirty="0" smtClean="0"/>
+              <a:t>um	= </a:t>
+            </a:r>
+            <a:r>
+              <a:rPr lang="en-US" dirty="0" err="1" smtClean="0"/>
+              <a:t>foldr</a:t>
+            </a:r>
+            <a:r>
+              <a:rPr lang="en-US" dirty="0" smtClean="0"/>
+              <a:t> (+) 0</a:t>
+            </a:r>
+          </a:p>
+          <a:p>
+            <a:pPr>
+              <a:buFont typeface="Wingdings" charset="2"/>
+              <a:buChar char="§"/>
+            </a:pPr>
+            <a:r>
+              <a:rPr lang="en-US" dirty="0" smtClean="0"/>
+              <a:t>product	= </a:t>
+            </a:r>
+            <a:r>
+              <a:rPr lang="en-US" dirty="0" err="1" smtClean="0"/>
+              <a:t>foldr</a:t>
+            </a:r>
+            <a:r>
+              <a:rPr lang="en-US" dirty="0" smtClean="0"/>
+              <a:t> (*) 1</a:t>
+            </a:r>
+          </a:p>
+          <a:p>
+            <a:pPr>
+              <a:buFont typeface="Wingdings" charset="2"/>
+              <a:buChar char="§"/>
+            </a:pPr>
+            <a:r>
+              <a:rPr lang="en-US" dirty="0" err="1" smtClean="0"/>
+              <a:t>a</a:t>
+            </a:r>
+            <a:r>
+              <a:rPr lang="en-US" dirty="0" err="1" smtClean="0"/>
+              <a:t>nytrue</a:t>
+            </a:r>
+            <a:r>
+              <a:rPr lang="en-US" dirty="0" smtClean="0"/>
+              <a:t>	= </a:t>
+            </a:r>
+            <a:r>
+              <a:rPr lang="en-US" dirty="0" err="1" smtClean="0"/>
+              <a:t>foldr</a:t>
+            </a:r>
+            <a:r>
+              <a:rPr lang="en-US" dirty="0" smtClean="0"/>
+              <a:t> (∨) false</a:t>
+            </a:r>
+          </a:p>
+          <a:p>
+            <a:pPr>
+              <a:buFont typeface="Wingdings" charset="2"/>
+              <a:buChar char="§"/>
+            </a:pPr>
+            <a:r>
+              <a:rPr lang="en-US" dirty="0" err="1" smtClean="0"/>
+              <a:t>alltrue</a:t>
+            </a:r>
+            <a:r>
+              <a:rPr lang="en-US" dirty="0" smtClean="0"/>
+              <a:t>	= </a:t>
+            </a:r>
+            <a:r>
+              <a:rPr lang="en-US" dirty="0" err="1" smtClean="0"/>
+              <a:t>foldr</a:t>
+            </a:r>
+            <a:r>
+              <a:rPr lang="en-US" dirty="0" smtClean="0"/>
+              <a:t> (</a:t>
+            </a:r>
+            <a:r>
+              <a:rPr lang="en-US" dirty="0" smtClean="0"/>
+              <a:t>∧</a:t>
+            </a:r>
+            <a:r>
+              <a:rPr lang="en-US" dirty="0" smtClean="0"/>
+              <a:t>) true</a:t>
+            </a:r>
+          </a:p>
+          <a:p>
+            <a:pPr>
+              <a:buFont typeface="Wingdings" charset="2"/>
+              <a:buChar char="§"/>
+            </a:pPr>
+            <a:r>
+              <a:rPr lang="en-US" dirty="0" smtClean="0"/>
+              <a:t>map	= </a:t>
+            </a:r>
+            <a:r>
+              <a:rPr lang="en-US" dirty="0" err="1" smtClean="0"/>
+              <a:t>foldr</a:t>
+            </a:r>
+            <a:r>
+              <a:rPr lang="en-US" dirty="0" smtClean="0"/>
+              <a:t> (cons </a:t>
+            </a:r>
+            <a:r>
+              <a:rPr lang="en-US" dirty="0" smtClean="0"/>
+              <a:t>.</a:t>
+            </a:r>
+            <a:r>
+              <a:rPr lang="en-US" dirty="0" smtClean="0"/>
+              <a:t> </a:t>
+            </a:r>
+            <a:r>
+              <a:rPr lang="en-US" dirty="0" err="1" smtClean="0"/>
+              <a:t>f</a:t>
+            </a:r>
+            <a:r>
+              <a:rPr lang="en-US" dirty="0" smtClean="0"/>
+              <a:t>) []</a:t>
+            </a:r>
+          </a:p>
+          <a:p>
+            <a:pPr>
+              <a:buFont typeface="Wingdings" charset="2"/>
+              <a:buChar char="§"/>
+            </a:pPr>
+            <a:endParaRPr lang="en-US" dirty="0" smtClean="0"/>
+          </a:p>
+          <a:p>
+            <a:pPr>
+              <a:buFont typeface="Wingdings" charset="2"/>
+              <a:buChar char="§"/>
+            </a:pPr>
+            <a:r>
+              <a:rPr lang="en-US" dirty="0" smtClean="0"/>
+              <a:t>By </a:t>
+            </a:r>
+            <a:r>
+              <a:rPr lang="en-US" dirty="0" smtClean="0">
+                <a:solidFill>
+                  <a:srgbClr val="6EA0B0"/>
+                </a:solidFill>
+              </a:rPr>
+              <a:t>partially applying </a:t>
+            </a:r>
+            <a:r>
+              <a:rPr lang="en-US" dirty="0" smtClean="0"/>
+              <a:t>folds, we can define new list functions with very little programming!</a:t>
+            </a:r>
+          </a:p>
+        </p:txBody>
+      </p:sp>
+    </p:spTree>
+  </p:cSld>
+  <p:clrMapOvr>
+    <a:masterClrMapping/>
+  </p:clrMapOvr>
+</p:sld>
+</file>
+
+<file path=ppt/slides/slide25.xml><?xml version="1.0" encoding="utf-8"?>
+<p:sld xmlns:a="http://schemas.openxmlformats.org/drawingml/2006/main" xmlns:r="http://schemas.openxmlformats.org/officeDocument/2006/relationships" xmlns:mc="http://schemas.openxmlformats.org/markup-compatibility/2006" xmlns:mv="urn:schemas-microsoft-com:mac:vml" xmlns:p="http://schemas.openxmlformats.org/presentationml/2006/main" mc:Ignorable="mv" mc:PreserveAttributes="mv:*">
+  <p:cSld>
+    <p:spTree>
+      <p:nvGrpSpPr>
+        <p:cNvPr id="1" name=""/>
+        <p:cNvGrpSpPr/>
+        <p:nvPr/>
+      </p:nvGrpSpPr>
+      <p:grpSpPr>
+        <a:xfrm>
+          <a:off x="0" y="0"/>
+          <a:ext cx="0" cy="0"/>
+          <a:chOff x="0" y="0"/>
+          <a:chExt cx="0" cy="0"/>
+        </a:xfrm>
+      </p:grpSpPr>
+      <p:sp>
+        <p:nvSpPr>
+          <p:cNvPr id="2" name="Title 1"/>
+          <p:cNvSpPr>
+            <a:spLocks noGrp="1"/>
+          </p:cNvSpPr>
+          <p:nvPr>
+            <p:ph type="title"/>
+          </p:nvPr>
+        </p:nvSpPr>
+        <p:spPr/>
+        <p:txBody>
+          <a:bodyPr/>
+          <a:lstStyle/>
+          <a:p>
+            <a:r>
+              <a:rPr lang="en-US" dirty="0" smtClean="0"/>
+              <a:t>Real-World Examples</a:t>
+            </a:r>
+            <a:endParaRPr lang="en-US" dirty="0"/>
+          </a:p>
+        </p:txBody>
+      </p:sp>
+      <p:sp>
+        <p:nvSpPr>
+          <p:cNvPr id="3" name="Content Placeholder 2"/>
+          <p:cNvSpPr>
+            <a:spLocks noGrp="1"/>
+          </p:cNvSpPr>
+          <p:nvPr>
+            <p:ph idx="1"/>
+          </p:nvPr>
+        </p:nvSpPr>
+        <p:spPr/>
+        <p:txBody>
+          <a:bodyPr/>
+          <a:lstStyle/>
+          <a:p>
+            <a:pPr>
+              <a:buFont typeface="Wingdings" charset="2"/>
+              <a:buChar char="§"/>
+            </a:pPr>
+            <a:r>
+              <a:rPr lang="en-US" dirty="0" smtClean="0"/>
+              <a:t>Strategy pattern. </a:t>
+            </a:r>
+            <a:r>
+              <a:rPr lang="en-US" dirty="0" smtClean="0"/>
+              <a:t>H</a:t>
+            </a:r>
+            <a:r>
+              <a:rPr lang="en-US" dirty="0" smtClean="0"/>
+              <a:t>igher-order functions supplant the need for extra code.</a:t>
+            </a:r>
+          </a:p>
+          <a:p>
+            <a:pPr>
+              <a:buFont typeface="Wingdings" charset="2"/>
+              <a:buChar char="§"/>
+            </a:pPr>
+            <a:r>
+              <a:rPr lang="en-US" dirty="0" smtClean="0"/>
+              <a:t>“loan” pattern.</a:t>
+            </a:r>
+          </a:p>
+          <a:p>
+            <a:pPr>
+              <a:buFont typeface="Wingdings" charset="2"/>
+              <a:buChar char="§"/>
+            </a:pPr>
+            <a:r>
+              <a:rPr lang="en-US" dirty="0" smtClean="0"/>
+              <a:t>Event handling in the Lift framework.</a:t>
+            </a:r>
+          </a:p>
+          <a:p>
+            <a:pPr>
+              <a:buFont typeface="Wingdings" charset="2"/>
+              <a:buChar char="§"/>
+            </a:pPr>
+            <a:r>
+              <a:rPr lang="en-US" dirty="0" smtClean="0"/>
+              <a:t>List tasks (partitioning, filtering, transforming).</a:t>
+            </a:r>
+          </a:p>
+        </p:txBody>
+      </p:sp>
+    </p:spTree>
+  </p:cSld>
+  <p:clrMapOvr>
+    <a:masterClrMapping/>
+  </p:clrMapOvr>
+</p:sld>
+</file>
+
+<file path=ppt/slides/slide26.xml><?xml version="1.0" encoding="utf-8"?>
+<p:sld xmlns:a="http://schemas.openxmlformats.org/drawingml/2006/main" xmlns:r="http://schemas.openxmlformats.org/officeDocument/2006/relationships" xmlns:mc="http://schemas.openxmlformats.org/markup-compatibility/2006" xmlns:mv="urn:schemas-microsoft-com:mac:vml" xmlns:p="http://schemas.openxmlformats.org/presentationml/2006/main" mc:Ignorable="mv" mc:PreserveAttributes="mv:*">
+  <p:cSld>
+    <p:spTree>
+      <p:nvGrpSpPr>
+        <p:cNvPr id="1" name=""/>
+        <p:cNvGrpSpPr/>
+        <p:nvPr/>
+      </p:nvGrpSpPr>
+      <p:grpSpPr>
+        <a:xfrm>
+          <a:off x="0" y="0"/>
+          <a:ext cx="0" cy="0"/>
+          <a:chOff x="0" y="0"/>
+          <a:chExt cx="0" cy="0"/>
+        </a:xfrm>
+      </p:grpSpPr>
+      <p:sp>
+        <p:nvSpPr>
+          <p:cNvPr id="2" name="Title 1"/>
+          <p:cNvSpPr>
+            <a:spLocks noGrp="1"/>
+          </p:cNvSpPr>
+          <p:nvPr>
+            <p:ph type="title"/>
+          </p:nvPr>
+        </p:nvSpPr>
+        <p:spPr/>
+        <p:txBody>
+          <a:bodyPr/>
+          <a:lstStyle/>
+          <a:p>
+            <a:r>
+              <a:rPr lang="en-US" dirty="0" smtClean="0"/>
+              <a:t>What we Didn’t Cover</a:t>
+            </a:r>
+            <a:endParaRPr lang="en-US" dirty="0"/>
+          </a:p>
+        </p:txBody>
+      </p:sp>
+      <p:sp>
+        <p:nvSpPr>
+          <p:cNvPr id="3" name="Content Placeholder 2"/>
+          <p:cNvSpPr>
+            <a:spLocks noGrp="1"/>
+          </p:cNvSpPr>
+          <p:nvPr>
+            <p:ph idx="1"/>
+          </p:nvPr>
+        </p:nvSpPr>
+        <p:spPr/>
+        <p:txBody>
+          <a:bodyPr/>
+          <a:lstStyle/>
+          <a:p>
+            <a:pPr>
+              <a:buFont typeface="Wingdings" charset="2"/>
+              <a:buChar char="§"/>
+            </a:pPr>
+            <a:r>
+              <a:rPr lang="en-US" dirty="0" smtClean="0"/>
+              <a:t>Currying</a:t>
+            </a:r>
+          </a:p>
+          <a:p>
+            <a:pPr>
+              <a:buFont typeface="Wingdings" charset="2"/>
+              <a:buChar char="§"/>
+            </a:pPr>
+            <a:r>
+              <a:rPr lang="en-US" dirty="0" smtClean="0"/>
+              <a:t>Pattern matching</a:t>
+            </a:r>
+          </a:p>
+          <a:p>
+            <a:pPr>
+              <a:buFont typeface="Wingdings" charset="2"/>
+              <a:buChar char="§"/>
+            </a:pPr>
+            <a:r>
+              <a:rPr lang="en-US" dirty="0" smtClean="0"/>
+              <a:t>Type inference, higher-</a:t>
+            </a:r>
+            <a:r>
+              <a:rPr lang="en-US" dirty="0" err="1" smtClean="0"/>
+              <a:t>kinded</a:t>
+            </a:r>
+            <a:r>
+              <a:rPr lang="en-US" dirty="0" smtClean="0"/>
+              <a:t> types, and general type systems</a:t>
+            </a:r>
+          </a:p>
+          <a:p>
+            <a:pPr>
+              <a:buFont typeface="Wingdings" charset="2"/>
+              <a:buChar char="§"/>
+            </a:pPr>
+            <a:r>
+              <a:rPr lang="en-US" dirty="0" smtClean="0"/>
+              <a:t>Partial function application</a:t>
+            </a:r>
+          </a:p>
+          <a:p>
+            <a:pPr>
+              <a:buFont typeface="Wingdings" charset="2"/>
+              <a:buChar char="§"/>
+            </a:pPr>
+            <a:r>
+              <a:rPr lang="en-US" dirty="0" smtClean="0"/>
+              <a:t>Lazy evaluation</a:t>
+            </a:r>
+          </a:p>
+          <a:p>
+            <a:pPr>
+              <a:buFont typeface="Wingdings" charset="2"/>
+              <a:buChar char="§"/>
+            </a:pPr>
+            <a:r>
+              <a:rPr lang="en-US" dirty="0" smtClean="0"/>
+              <a:t>MORE!</a:t>
+            </a:r>
+          </a:p>
+        </p:txBody>
+      </p:sp>
+    </p:spTree>
+  </p:cSld>
+  <p:clrMapOvr>
+    <a:masterClrMapping/>
+  </p:clrMapOvr>
+</p:sld>
+</file>
+
+<file path=ppt/slides/slide27.xml><?xml version="1.0" encoding="utf-8"?>
+<p:sld xmlns:a="http://schemas.openxmlformats.org/drawingml/2006/main" xmlns:r="http://schemas.openxmlformats.org/officeDocument/2006/relationships" xmlns:mc="http://schemas.openxmlformats.org/markup-compatibility/2006" xmlns:mv="urn:schemas-microsoft-com:mac:vml" xmlns:p="http://schemas.openxmlformats.org/presentationml/2006/main" mc:Ignorable="mv" mc:PreserveAttributes="mv:*">
+  <p:cSld>
+    <p:spTree>
+      <p:nvGrpSpPr>
+        <p:cNvPr id="1" name=""/>
+        <p:cNvGrpSpPr/>
+        <p:nvPr/>
+      </p:nvGrpSpPr>
+      <p:grpSpPr>
+        <a:xfrm>
+          <a:off x="0" y="0"/>
+          <a:ext cx="0" cy="0"/>
+          <a:chOff x="0" y="0"/>
+          <a:chExt cx="0" cy="0"/>
+        </a:xfrm>
+      </p:grpSpPr>
+      <p:sp>
+        <p:nvSpPr>
+          <p:cNvPr id="2" name="Title 1"/>
+          <p:cNvSpPr>
+            <a:spLocks noGrp="1"/>
+          </p:cNvSpPr>
+          <p:nvPr>
+            <p:ph type="title"/>
+          </p:nvPr>
+        </p:nvSpPr>
+        <p:spPr/>
+        <p:txBody>
+          <a:bodyPr/>
+          <a:lstStyle/>
+          <a:p>
+            <a:pPr algn="ctr"/>
+            <a:r>
+              <a:rPr lang="en-US" dirty="0" smtClean="0"/>
+              <a:t>Questions?</a:t>
+            </a:r>
+            <a:endParaRPr lang="en-US" dirty="0"/>
+          </a:p>
+        </p:txBody>
+      </p:sp>
+      <p:sp>
+        <p:nvSpPr>
+          <p:cNvPr id="3" name="Content Placeholder 2"/>
+          <p:cNvSpPr>
+            <a:spLocks noGrp="1"/>
+          </p:cNvSpPr>
+          <p:nvPr>
+            <p:ph idx="1"/>
+          </p:nvPr>
+        </p:nvSpPr>
+        <p:spPr>
+          <a:xfrm>
+            <a:off x="457199" y="1600200"/>
+            <a:ext cx="8106937" cy="4525963"/>
+          </a:xfrm>
+        </p:spPr>
+        <p:txBody>
+          <a:bodyPr/>
+          <a:lstStyle/>
+          <a:p>
+            <a:pPr>
+              <a:buNone/>
+            </a:pPr>
+            <a:r>
+              <a:rPr lang="en-US" dirty="0" smtClean="0"/>
+              <a:t>Sample code available at</a:t>
+            </a:r>
+            <a:r>
+              <a:rPr lang="en-US" dirty="0" smtClean="0">
+                <a:solidFill>
+                  <a:schemeClr val="accent1">
+                    <a:lumMod val="60000"/>
+                    <a:lumOff val="40000"/>
+                  </a:schemeClr>
+                </a:solidFill>
+              </a:rPr>
+              <a:t> </a:t>
+            </a:r>
+            <a:br>
+              <a:rPr lang="en-US" dirty="0" smtClean="0">
+                <a:solidFill>
+                  <a:schemeClr val="accent1">
+                    <a:lumMod val="60000"/>
+                    <a:lumOff val="40000"/>
+                  </a:schemeClr>
+                </a:solidFill>
+              </a:rPr>
+            </a:br>
+            <a:r>
+              <a:rPr lang="en-US" sz="2000" dirty="0" smtClean="0">
+                <a:solidFill>
+                  <a:schemeClr val="accent1">
+                    <a:lumMod val="60000"/>
+                    <a:lumOff val="40000"/>
+                  </a:schemeClr>
+                </a:solidFill>
+              </a:rPr>
+              <a:t>http</a:t>
+            </a:r>
+            <a:r>
+              <a:rPr lang="en-US" sz="2000" dirty="0" smtClean="0">
+                <a:solidFill>
+                  <a:schemeClr val="accent1">
+                    <a:lumMod val="60000"/>
+                    <a:lumOff val="40000"/>
+                  </a:schemeClr>
+                </a:solidFill>
+              </a:rPr>
+              <a:t>://github.com/</a:t>
+            </a:r>
+            <a:r>
+              <a:rPr lang="en-US" sz="2000" dirty="0" smtClean="0">
+                <a:solidFill>
+                  <a:schemeClr val="accent1">
+                    <a:lumMod val="60000"/>
+                    <a:lumOff val="40000"/>
+                  </a:schemeClr>
+                </a:solidFill>
+              </a:rPr>
+              <a:t>chrislewis/JaxFunc_0_ImperativelyFunctional</a:t>
+            </a:r>
+            <a:endParaRPr lang="en-US" sz="2000" dirty="0" smtClean="0">
+              <a:solidFill>
+                <a:schemeClr val="accent1">
+                  <a:lumMod val="60000"/>
+                  <a:lumOff val="40000"/>
+                </a:schemeClr>
+              </a:solidFill>
+            </a:endParaRPr>
+          </a:p>
+          <a:p>
+            <a:endParaRPr lang="en-US" dirty="0"/>
+          </a:p>
+        </p:txBody>
+      </p:sp>
+    </p:spTree>
+  </p:cSld>
+  <p:clrMapOvr>
+    <a:masterClrMapping/>
+  </p:clrMapOvr>
+</p:sld>
+</file>
+
+<file path=ppt/slides/slide28.xml><?xml version="1.0" encoding="utf-8"?>
+<p:sld xmlns:a="http://schemas.openxmlformats.org/drawingml/2006/main" xmlns:r="http://schemas.openxmlformats.org/officeDocument/2006/relationships" xmlns:mc="http://schemas.openxmlformats.org/markup-compatibility/2006" xmlns:mv="urn:schemas-microsoft-com:mac:vml" xmlns:p="http://schemas.openxmlformats.org/presentationml/2006/main" mc:Ignorable="mv" mc:PreserveAttributes="mv:*">
+  <p:cSld>
+    <p:spTree>
+      <p:nvGrpSpPr>
+        <p:cNvPr id="1" name=""/>
+        <p:cNvGrpSpPr/>
+        <p:nvPr/>
+      </p:nvGrpSpPr>
+      <p:grpSpPr>
+        <a:xfrm>
+          <a:off x="0" y="0"/>
+          <a:ext cx="0" cy="0"/>
+          <a:chOff x="0" y="0"/>
+          <a:chExt cx="0" cy="0"/>
+        </a:xfrm>
+      </p:grpSpPr>
+      <p:sp>
+        <p:nvSpPr>
+          <p:cNvPr id="3" name="TextBox 2"/>
+          <p:cNvSpPr txBox="1"/>
+          <p:nvPr/>
+        </p:nvSpPr>
+        <p:spPr>
+          <a:xfrm>
+            <a:off x="1745079" y="2514061"/>
+            <a:ext cx="5738370" cy="1384995"/>
+          </a:xfrm>
+          <a:prstGeom prst="rect">
+            <a:avLst/>
+          </a:prstGeom>
+          <a:noFill/>
+        </p:spPr>
+        <p:txBody>
+          <a:bodyPr wrap="none" rtlCol="0">
+            <a:spAutoFit/>
+          </a:bodyPr>
+          <a:lstStyle/>
+          <a:p>
+            <a:r>
+              <a:rPr lang="en-US" sz="2800" dirty="0" err="1"/>
+              <a:t>c</a:t>
+            </a:r>
+            <a:r>
+              <a:rPr lang="en-US" sz="2800" dirty="0" err="1" smtClean="0"/>
+              <a:t>hris</a:t>
+            </a:r>
+            <a:r>
+              <a:rPr lang="en-US" sz="2800" dirty="0" smtClean="0"/>
+              <a:t> </a:t>
+            </a:r>
+            <a:r>
+              <a:rPr lang="en-US" sz="2800" dirty="0" err="1" smtClean="0"/>
+              <a:t>lewis</a:t>
+            </a:r>
+            <a:r>
+              <a:rPr lang="en-US" sz="2800" dirty="0" smtClean="0"/>
+              <a:t> / </a:t>
+            </a:r>
+            <a:r>
+              <a:rPr lang="en-US" sz="2800" dirty="0" err="1" smtClean="0">
+                <a:solidFill>
+                  <a:schemeClr val="accent1">
+                    <a:lumMod val="60000"/>
+                    <a:lumOff val="40000"/>
+                  </a:schemeClr>
+                </a:solidFill>
+              </a:rPr>
+              <a:t>chris@thegodcode.net</a:t>
+            </a:r>
+            <a:endParaRPr lang="en-US" sz="2800" dirty="0" smtClean="0">
+              <a:solidFill>
+                <a:schemeClr val="accent1">
+                  <a:lumMod val="60000"/>
+                  <a:lumOff val="40000"/>
+                </a:schemeClr>
+              </a:solidFill>
+            </a:endParaRPr>
+          </a:p>
+          <a:p>
+            <a:r>
+              <a:rPr lang="en-US" sz="2800" dirty="0" smtClean="0">
+                <a:solidFill>
+                  <a:schemeClr val="accent1">
+                    <a:lumMod val="60000"/>
+                    <a:lumOff val="40000"/>
+                  </a:schemeClr>
+                </a:solidFill>
+              </a:rPr>
+              <a:t>http://twitter.com/burningodzilla</a:t>
+            </a:r>
+            <a:endParaRPr lang="en-US" sz="2800" dirty="0">
+              <a:solidFill>
+                <a:schemeClr val="accent1">
+                  <a:lumMod val="60000"/>
+                  <a:lumOff val="40000"/>
+                </a:schemeClr>
+              </a:solidFill>
+            </a:endParaRPr>
+          </a:p>
+          <a:p>
+            <a:r>
+              <a:rPr lang="en-US" sz="2800" dirty="0" smtClean="0">
+                <a:solidFill>
+                  <a:schemeClr val="accent1">
+                    <a:lumMod val="60000"/>
+                    <a:lumOff val="40000"/>
+                  </a:schemeClr>
+                </a:solidFill>
+              </a:rPr>
+              <a:t>http://github.com/chrislewis/</a:t>
+            </a:r>
+          </a:p>
+        </p:txBody>
+      </p:sp>
+      <p:sp>
+        <p:nvSpPr>
+          <p:cNvPr id="4" name="Title 1"/>
+          <p:cNvSpPr txBox="1">
+            <a:spLocks/>
+          </p:cNvSpPr>
+          <p:nvPr/>
+        </p:nvSpPr>
+        <p:spPr>
+          <a:xfrm>
+            <a:off x="3170444" y="782176"/>
+            <a:ext cx="3090200" cy="1143000"/>
+          </a:xfrm>
+          <a:prstGeom prst="rect">
+            <a:avLst/>
+          </a:prstGeom>
+        </p:spPr>
+        <p:txBody>
+          <a:bodyPr vert="horz" lIns="45720" rIns="45720" anchor="ctr">
+            <a:normAutofit/>
+          </a:bodyPr>
+          <a:lstStyle/>
+          <a:p>
+            <a:pPr marL="0" marR="0" lvl="0" indent="0" algn="l" defTabSz="914400" rtl="0" eaLnBrk="1" fontAlgn="auto" latinLnBrk="0" hangingPunct="1">
+              <a:lnSpc>
+                <a:spcPct val="100000"/>
+              </a:lnSpc>
+              <a:spcBef>
+                <a:spcPct val="0"/>
+              </a:spcBef>
+              <a:spcAft>
+                <a:spcPts val="0"/>
+              </a:spcAft>
+              <a:buClrTx/>
+              <a:buSzTx/>
+              <a:buFontTx/>
+              <a:buNone/>
+              <a:tabLst/>
+              <a:defRPr/>
+            </a:pPr>
+            <a:r>
+              <a:rPr kumimoji="0" lang="en-US" sz="4600" b="0" i="0" u="none" strike="noStrike" kern="1200" cap="none" spc="0" normalizeH="0" baseline="0" noProof="0" dirty="0" smtClean="0">
+                <a:ln>
+                  <a:noFill/>
+                </a:ln>
+                <a:solidFill>
+                  <a:schemeClr val="tx1"/>
+                </a:solidFill>
+                <a:effectLst/>
+                <a:uLnTx/>
+                <a:uFillTx/>
+                <a:latin typeface="+mj-lt"/>
+                <a:ea typeface="+mj-ea"/>
+                <a:cs typeface="+mj-cs"/>
+              </a:rPr>
+              <a:t>Thanks!</a:t>
+            </a:r>
+            <a:endParaRPr kumimoji="0" lang="en-US" sz="4600" b="0" i="0" u="none" strike="noStrike" kern="1200" cap="none" spc="0" normalizeH="0" baseline="0" noProof="0" dirty="0">
+              <a:ln>
+                <a:noFill/>
+              </a:ln>
+              <a:solidFill>
+                <a:schemeClr val="tx1"/>
+              </a:solidFill>
+              <a:effectLst/>
+              <a:uLnTx/>
+              <a:uFillTx/>
+              <a:latin typeface="+mj-lt"/>
+              <a:ea typeface="+mj-ea"/>
+              <a:cs typeface="+mj-cs"/>
+            </a:endParaRPr>
           </a:p>
         </p:txBody>
       </p:sp>
@@ -5783,7 +7778,6 @@
               <a:rPr lang="en-US" dirty="0" smtClean="0"/>
               <a:t>.</a:t>
             </a:r>
-            <a:endParaRPr lang="en-US" dirty="0" smtClean="0"/>
           </a:p>
         </p:txBody>
       </p:sp>
@@ -6598,19 +8592,7 @@
             </a:pPr>
             <a:r>
               <a:rPr lang="en-US" dirty="0" smtClean="0"/>
-              <a:t>A</a:t>
-            </a:r>
-            <a:r>
-              <a:rPr lang="en-US" dirty="0" smtClean="0"/>
-              <a:t> closure is a function whose </a:t>
-            </a:r>
-            <a:r>
-              <a:rPr lang="en-US" dirty="0" smtClean="0"/>
-              <a:t>definition “closes” over free variables</a:t>
-            </a:r>
-            <a:r>
-              <a:rPr lang="en-US" dirty="0" smtClean="0"/>
-              <a:t>.</a:t>
+              <a:t>A closure is a function whose definition “closes” over free variables.</a:t>
             </a:r>
           </a:p>
           <a:p>
@@ -6620,15 +8602,7 @@
             </a:pPr>
             <a:r>
               <a:rPr lang="en-US" dirty="0" smtClean="0"/>
-              <a:t>A lambda expression that doesn’t close over free variables isn’t a closure, </a:t>
-            </a:r>
-            <a:r>
-              <a:rPr lang="en-US" dirty="0" smtClean="0"/>
-              <a:t>strictly speaking</a:t>
-            </a:r>
-            <a:r>
-              <a:rPr lang="en-US" dirty="0" smtClean="0"/>
-              <a:t>.</a:t>
+              <a:t>A lambda expression that doesn’t close over free variables isn’t a closure, strictly speaking.</a:t>
             </a:r>
           </a:p>
           <a:p>

</xml_diff>

<commit_message>
scheme fix; comments in Loaner
</commit_message>
<xml_diff>
--- a/JaxFunc.pptx
+++ b/JaxFunc.pptx
@@ -521,7 +521,7 @@
             <a:fld id="{B5FBB243-1215-0146-8C14-45727866649E}" type="datetimeFigureOut">
               <a:rPr lang="en-US" smtClean="0"/>
               <a:pPr/>
-              <a:t>6/15/10</a:t>
+              <a:t>6/17/10</a:t>
             </a:fld>
             <a:endParaRPr lang="en-US"/>
           </a:p>
@@ -688,7 +688,7 @@
             <a:fld id="{B5FBB243-1215-0146-8C14-45727866649E}" type="datetimeFigureOut">
               <a:rPr lang="en-US" smtClean="0"/>
               <a:pPr/>
-              <a:t>6/15/10</a:t>
+              <a:t>6/17/10</a:t>
             </a:fld>
             <a:endParaRPr lang="en-US"/>
           </a:p>
@@ -865,7 +865,7 @@
             <a:fld id="{B5FBB243-1215-0146-8C14-45727866649E}" type="datetimeFigureOut">
               <a:rPr lang="en-US" smtClean="0"/>
               <a:pPr/>
-              <a:t>6/15/10</a:t>
+              <a:t>6/17/10</a:t>
             </a:fld>
             <a:endParaRPr lang="en-US"/>
           </a:p>
@@ -1036,7 +1036,7 @@
             <a:fld id="{B5FBB243-1215-0146-8C14-45727866649E}" type="datetimeFigureOut">
               <a:rPr lang="en-US" smtClean="0"/>
               <a:pPr/>
-              <a:t>6/15/10</a:t>
+              <a:t>6/17/10</a:t>
             </a:fld>
             <a:endParaRPr lang="en-US"/>
           </a:p>
@@ -1488,7 +1488,7 @@
             <a:fld id="{B5FBB243-1215-0146-8C14-45727866649E}" type="datetimeFigureOut">
               <a:rPr lang="en-US" smtClean="0"/>
               <a:pPr/>
-              <a:t>6/15/10</a:t>
+              <a:t>6/17/10</a:t>
             </a:fld>
             <a:endParaRPr lang="en-US"/>
           </a:p>
@@ -1754,7 +1754,7 @@
             <a:fld id="{B5FBB243-1215-0146-8C14-45727866649E}" type="datetimeFigureOut">
               <a:rPr lang="en-US" smtClean="0"/>
               <a:pPr/>
-              <a:t>6/15/10</a:t>
+              <a:t>6/17/10</a:t>
             </a:fld>
             <a:endParaRPr lang="en-US"/>
           </a:p>
@@ -2130,7 +2130,7 @@
             <a:fld id="{B5FBB243-1215-0146-8C14-45727866649E}" type="datetimeFigureOut">
               <a:rPr lang="en-US" smtClean="0"/>
               <a:pPr/>
-              <a:t>6/15/10</a:t>
+              <a:t>6/17/10</a:t>
             </a:fld>
             <a:endParaRPr lang="en-US"/>
           </a:p>
@@ -2254,7 +2254,7 @@
             <a:fld id="{B5FBB243-1215-0146-8C14-45727866649E}" type="datetimeFigureOut">
               <a:rPr lang="en-US" smtClean="0"/>
               <a:pPr/>
-              <a:t>6/15/10</a:t>
+              <a:t>6/17/10</a:t>
             </a:fld>
             <a:endParaRPr lang="en-US"/>
           </a:p>
@@ -2346,7 +2346,7 @@
             <a:fld id="{B5FBB243-1215-0146-8C14-45727866649E}" type="datetimeFigureOut">
               <a:rPr lang="en-US" smtClean="0"/>
               <a:pPr/>
-              <a:t>6/15/10</a:t>
+              <a:t>6/17/10</a:t>
             </a:fld>
             <a:endParaRPr lang="en-US"/>
           </a:p>
@@ -2597,7 +2597,7 @@
             <a:fld id="{B5FBB243-1215-0146-8C14-45727866649E}" type="datetimeFigureOut">
               <a:rPr lang="en-US" smtClean="0"/>
               <a:pPr/>
-              <a:t>6/15/10</a:t>
+              <a:t>6/17/10</a:t>
             </a:fld>
             <a:endParaRPr lang="en-US"/>
           </a:p>
@@ -2858,7 +2858,7 @@
             <a:fld id="{B5FBB243-1215-0146-8C14-45727866649E}" type="datetimeFigureOut">
               <a:rPr lang="en-US" smtClean="0"/>
               <a:pPr/>
-              <a:t>6/15/10</a:t>
+              <a:t>6/17/10</a:t>
             </a:fld>
             <a:endParaRPr lang="en-US"/>
           </a:p>
@@ -3264,7 +3264,7 @@
             <a:fld id="{B5FBB243-1215-0146-8C14-45727866649E}" type="datetimeFigureOut">
               <a:rPr lang="en-US" smtClean="0"/>
               <a:pPr/>
-              <a:t>6/15/10</a:t>
+              <a:t>6/17/10</a:t>
             </a:fld>
             <a:endParaRPr lang="en-US"/>
           </a:p>
@@ -4596,11 +4596,7 @@
             </a:pPr>
             <a:r>
               <a:rPr lang="en-US" dirty="0" smtClean="0"/>
-              <a:t>A closure is a function whose definition “closes” over free variables</a:t>
-            </a:r>
-            <a:r>
-              <a:rPr lang="en-US" dirty="0" smtClean="0"/>
-              <a:t>.</a:t>
+              <a:t>A closure is a function whose definition “closes” over free variables.</a:t>
             </a:r>
           </a:p>
         </p:txBody>
@@ -4695,11 +4691,7 @@
             </a:pPr>
             <a:r>
               <a:rPr lang="en-US" dirty="0" smtClean="0"/>
-              <a:t>A </a:t>
-            </a:r>
-            <a:r>
-              <a:rPr lang="en-US" dirty="0" smtClean="0"/>
-              <a:t>lambda expression that doesn’t close over free variables isn’t a closure, strictly speaking.</a:t>
+              <a:t>A lambda expression that doesn’t close over free variables isn’t a closure, strictly speaking.</a:t>
             </a:r>
           </a:p>
           <a:p>
@@ -6166,16 +6158,7 @@
                 </a:solidFill>
                 <a:cs typeface="Rockwell"/>
               </a:rPr>
-              <a:t> </a:t>
-            </a:r>
-            <a:r>
-              <a:rPr lang="en-US" i="1" dirty="0" smtClean="0">
-                <a:solidFill>
-                  <a:srgbClr val="CCAF0A"/>
-                </a:solidFill>
-                <a:cs typeface="Rockwell"/>
-              </a:rPr>
-              <a:t>∘ </a:t>
+              <a:t> ∘ </a:t>
             </a:r>
             <a:r>
               <a:rPr lang="en-US" i="1" dirty="0" err="1" smtClean="0">
@@ -6265,14 +6248,7 @@
                 <a:latin typeface="+mj-lt"/>
                 <a:cs typeface="Rockwell"/>
               </a:rPr>
-              <a:t> into a new function that</a:t>
-            </a:r>
-            <a:r>
-              <a:rPr lang="en-US" dirty="0" smtClean="0">
-                <a:latin typeface="+mj-lt"/>
-                <a:cs typeface="Rockwell"/>
-              </a:rPr>
-              <a:t> applies </a:t>
+              <a:t> into a new function that applies </a:t>
             </a:r>
             <a:r>
               <a:rPr lang="en-US" dirty="0" err="1" smtClean="0">
@@ -6509,16 +6485,7 @@
                 </a:solidFill>
                 <a:cs typeface="Rockwell"/>
               </a:rPr>
-              <a:t> </a:t>
-            </a:r>
-            <a:r>
-              <a:rPr lang="en-US" i="1" dirty="0" smtClean="0">
-                <a:solidFill>
-                  <a:srgbClr val="CCAF0A"/>
-                </a:solidFill>
-                <a:cs typeface="Rockwell"/>
-              </a:rPr>
-              <a:t>∘ </a:t>
+              <a:t> ∘ </a:t>
             </a:r>
             <a:r>
               <a:rPr lang="en-US" i="1" dirty="0" err="1" smtClean="0">
@@ -6608,14 +6575,7 @@
                 <a:latin typeface="+mj-lt"/>
                 <a:cs typeface="Rockwell"/>
               </a:rPr>
-              <a:t> into a new function that</a:t>
-            </a:r>
-            <a:r>
-              <a:rPr lang="en-US" dirty="0" smtClean="0">
-                <a:latin typeface="+mj-lt"/>
-                <a:cs typeface="Rockwell"/>
-              </a:rPr>
-              <a:t> applies </a:t>
+              <a:t> into a new function that applies </a:t>
             </a:r>
             <a:r>
               <a:rPr lang="en-US" dirty="0" err="1" smtClean="0">
@@ -6886,8 +6846,10 @@
                   </a:schemeClr>
                 </a:solidFill>
               </a:rPr>
-              <a:t>/</a:t>
-            </a:r>
+              <a:t>// recursive implementation:</a:t>
+            </a:r>
+          </a:p>
+          <a:p>
             <a:r>
               <a:rPr lang="en-US" sz="2500" dirty="0" smtClean="0">
                 <a:solidFill>
@@ -6897,40 +6859,8 @@
                   </a:schemeClr>
                 </a:solidFill>
               </a:rPr>
-              <a:t>/ recursive implementation:</a:t>
-            </a:r>
-          </a:p>
-          <a:p>
-            <a:r>
-              <a:rPr lang="en-US" sz="2500" dirty="0" smtClean="0">
-                <a:solidFill>
-                  <a:schemeClr val="accent1">
-                    <a:lumMod val="60000"/>
-                    <a:lumOff val="40000"/>
-                  </a:schemeClr>
-                </a:solidFill>
-              </a:rPr>
-              <a:t>// http</a:t>
-            </a:r>
-            <a:r>
-              <a:rPr lang="en-US" sz="2500" dirty="0" smtClean="0">
-                <a:solidFill>
-                  <a:schemeClr val="accent1">
-                    <a:lumMod val="60000"/>
-                    <a:lumOff val="40000"/>
-                  </a:schemeClr>
-                </a:solidFill>
-              </a:rPr>
-              <a:t>://gist.github.com/366614</a:t>
-            </a:r>
-            <a:endParaRPr lang="en-US" sz="2500" dirty="0" smtClean="0">
-              <a:solidFill>
-                <a:schemeClr val="accent1">
-                  <a:lumMod val="60000"/>
-                  <a:lumOff val="40000"/>
-                </a:schemeClr>
-              </a:solidFill>
-            </a:endParaRPr>
+              <a:t>// http://gist.github.com/366614</a:t>
+            </a:r>
           </a:p>
         </p:txBody>
       </p:sp>
@@ -7075,15 +7005,7 @@
                   <a:srgbClr val="A8C6D0"/>
                 </a:solidFill>
               </a:rPr>
-              <a:t>// the </a:t>
-            </a:r>
-            <a:r>
-              <a:rPr lang="en-US" sz="2500" dirty="0" smtClean="0">
-                <a:solidFill>
-                  <a:srgbClr val="A8C6D0"/>
-                </a:solidFill>
-              </a:rPr>
-              <a:t>closure</a:t>
+              <a:t>// the closure</a:t>
             </a:r>
           </a:p>
         </p:txBody>
@@ -7144,11 +7066,7 @@
           <a:p>
             <a:r>
               <a:rPr lang="en-US" dirty="0" smtClean="0"/>
-              <a:t>Higher-Order </a:t>
-            </a:r>
-            <a:r>
-              <a:rPr lang="en-US" dirty="0" smtClean="0"/>
-              <a:t>Functions</a:t>
+              <a:t>Higher-Order Functions</a:t>
             </a:r>
             <a:br>
               <a:rPr lang="en-US" dirty="0" smtClean="0"/>
@@ -7197,26 +7115,14 @@
             </a:pPr>
             <a:r>
               <a:rPr lang="en-US" dirty="0" smtClean="0"/>
-              <a:t>Ruby, via Rails, brought higher-order functions</a:t>
-            </a:r>
-            <a:r>
-              <a:rPr lang="en-US" dirty="0" smtClean="0"/>
-              <a:t> that </a:t>
-            </a:r>
-            <a:r>
-              <a:rPr lang="en-US" dirty="0" smtClean="0"/>
-              <a:t>operate on</a:t>
+              <a:t>Ruby, via Rails, brought higher-order functions that operate on</a:t>
             </a:r>
             <a:br>
               <a:rPr lang="en-US" dirty="0" smtClean="0"/>
             </a:br>
             <a:r>
               <a:rPr lang="en-US" dirty="0" smtClean="0"/>
-              <a:t>lists </a:t>
-            </a:r>
-            <a:r>
-              <a:rPr lang="en-US" dirty="0" smtClean="0"/>
-              <a:t>mainstream.</a:t>
+              <a:t>lists mainstream.</a:t>
             </a:r>
           </a:p>
           <a:p>
@@ -8191,7 +8097,6 @@
               <a:rPr lang="en-US" dirty="0" smtClean="0"/>
               <a:t>) []</a:t>
             </a:r>
-            <a:endParaRPr lang="en-US" dirty="0" smtClean="0"/>
           </a:p>
           <a:p>
             <a:pPr>
@@ -9037,11 +8942,7 @@
           <a:p>
             <a:r>
               <a:rPr lang="en-US" sz="2500" dirty="0" smtClean="0"/>
-              <a:t>true :</a:t>
-            </a:r>
-            <a:r>
-              <a:rPr lang="en-US" sz="2500" dirty="0" smtClean="0"/>
-              <a:t>= </a:t>
+              <a:t>true := </a:t>
             </a:r>
             <a:r>
               <a:rPr lang="en-US" sz="2500" dirty="0" err="1" smtClean="0"/>
@@ -9198,11 +9099,7 @@
             </a:pPr>
             <a:r>
               <a:rPr lang="en-US" dirty="0" smtClean="0"/>
-              <a:t>Uniform treatment of data and functions</a:t>
-            </a:r>
-            <a:r>
-              <a:rPr lang="en-US" dirty="0" smtClean="0"/>
-              <a:t>;</a:t>
+              <a:t>Uniform treatment of data and functions;</a:t>
             </a:r>
             <a:br>
               <a:rPr lang="en-US" dirty="0" smtClean="0"/>
@@ -9213,15 +9110,7 @@
                   <a:srgbClr val="A8C6D0"/>
                 </a:solidFill>
               </a:rPr>
-              <a:t>higher</a:t>
-            </a:r>
-            <a:r>
-              <a:rPr lang="en-US" dirty="0" smtClean="0">
-                <a:solidFill>
-                  <a:srgbClr val="A8C6D0"/>
-                </a:solidFill>
-              </a:rPr>
-              <a:t>-order functions</a:t>
+              <a:t>higher-order functions</a:t>
             </a:r>
             <a:r>
               <a:rPr lang="en-US" dirty="0" smtClean="0">
@@ -9439,17 +9328,11 @@
           <a:p>
             <a:r>
               <a:rPr lang="en-US" sz="2000" dirty="0" smtClean="0"/>
-              <a:t>(define (is-even? X)</a:t>
-            </a:r>
-          </a:p>
-          <a:p>
-            <a:r>
-              <a:rPr lang="en-US" sz="2000" smtClean="0"/>
-              <a:t>  (</a:t>
+              <a:t>(define (is-even?</a:t>
             </a:r>
             <a:r>
               <a:rPr lang="en-US" sz="2000" dirty="0" smtClean="0"/>
-              <a:t>= 0 (modulo </a:t>
+              <a:t> </a:t>
             </a:r>
             <a:r>
               <a:rPr lang="en-US" sz="2000" dirty="0" err="1" smtClean="0"/>
@@ -9457,6 +9340,21 @@
             </a:r>
             <a:r>
               <a:rPr lang="en-US" sz="2000" dirty="0" smtClean="0"/>
+              <a:t>)</a:t>
+            </a:r>
+            <a:endParaRPr lang="en-US" sz="2000" dirty="0" smtClean="0"/>
+          </a:p>
+          <a:p>
+            <a:r>
+              <a:rPr lang="en-US" sz="2000" dirty="0" smtClean="0"/>
+              <a:t>  (= 0 (modulo </a:t>
+            </a:r>
+            <a:r>
+              <a:rPr lang="en-US" sz="2000" dirty="0" err="1" smtClean="0"/>
+              <a:t>x</a:t>
+            </a:r>
+            <a:r>
+              <a:rPr lang="en-US" sz="2000" dirty="0" smtClean="0"/>
               <a:t> 2)))</a:t>
             </a:r>
           </a:p>
@@ -9539,7 +9437,11 @@
           <a:p>
             <a:r>
               <a:rPr lang="en-US" sz="2000" dirty="0" smtClean="0"/>
-              <a:t>  (if (&gt; </a:t>
+              <a:t>  (if </a:t>
+            </a:r>
+            <a:r>
+              <a:rPr lang="en-US" sz="2000" dirty="0" smtClean="0"/>
+              <a:t>(&lt;= </a:t>
             </a:r>
             <a:r>
               <a:rPr lang="en-US" sz="2000" dirty="0" err="1" smtClean="0"/>
@@ -9691,26 +9593,14 @@
             </a:br>
             <a:r>
               <a:rPr lang="en-US" dirty="0" smtClean="0"/>
-              <a:t>higher-order functions </a:t>
-            </a:r>
-            <a:r>
-              <a:rPr lang="en-US" dirty="0" smtClean="0"/>
-              <a:t>and the</a:t>
+              <a:t>higher-order functions and the</a:t>
             </a:r>
             <a:br>
               <a:rPr lang="en-US" dirty="0" smtClean="0"/>
             </a:br>
             <a:r>
               <a:rPr lang="en-US" dirty="0" smtClean="0"/>
-              <a:t>treatment of</a:t>
-            </a:r>
-            <a:r>
-              <a:rPr lang="en-US" dirty="0" smtClean="0"/>
-              <a:t> </a:t>
-            </a:r>
-            <a:r>
-              <a:rPr lang="en-US" dirty="0" smtClean="0"/>
-              <a:t>functions as data.</a:t>
+              <a:t>treatment of functions as data.</a:t>
             </a:r>
             <a:br>
               <a:rPr lang="en-US" dirty="0" smtClean="0"/>

</xml_diff>